<commit_message>
Changed powerpoint slides and plot python files
</commit_message>
<xml_diff>
--- a/sampexlib/Concept Summaries/AGU Research Presentation (15min).pptx
+++ b/sampexlib/Concept Summaries/AGU Research Presentation (15min).pptx
@@ -7,11 +7,16 @@
   <p:sldIdLst>
     <p:sldId id="256" r:id="rId2"/>
     <p:sldId id="257" r:id="rId3"/>
-    <p:sldId id="258" r:id="rId4"/>
-    <p:sldId id="264" r:id="rId5"/>
-    <p:sldId id="265" r:id="rId6"/>
-    <p:sldId id="266" r:id="rId7"/>
-    <p:sldId id="267" r:id="rId8"/>
+    <p:sldId id="263" r:id="rId4"/>
+    <p:sldId id="258" r:id="rId5"/>
+    <p:sldId id="264" r:id="rId6"/>
+    <p:sldId id="273" r:id="rId7"/>
+    <p:sldId id="265" r:id="rId8"/>
+    <p:sldId id="267" r:id="rId9"/>
+    <p:sldId id="269" r:id="rId10"/>
+    <p:sldId id="270" r:id="rId11"/>
+    <p:sldId id="271" r:id="rId12"/>
+    <p:sldId id="272" r:id="rId13"/>
   </p:sldIdLst>
   <p:sldSz cx="12192000" cy="6858000"/>
   <p:notesSz cx="6858000" cy="9144000"/>
@@ -265,7 +270,7 @@
           <a:p>
             <a:fld id="{A9C2E571-38F2-4F73-B523-6EB95170224E}" type="datetimeFigureOut">
               <a:rPr lang="en-US" smtClean="0"/>
-              <a:t>11/24/2021</a:t>
+              <a:t>11/30/2021</a:t>
             </a:fld>
             <a:endParaRPr lang="en-US"/>
           </a:p>
@@ -463,7 +468,7 @@
           <a:p>
             <a:fld id="{A9C2E571-38F2-4F73-B523-6EB95170224E}" type="datetimeFigureOut">
               <a:rPr lang="en-US" smtClean="0"/>
-              <a:t>11/24/2021</a:t>
+              <a:t>11/30/2021</a:t>
             </a:fld>
             <a:endParaRPr lang="en-US"/>
           </a:p>
@@ -671,7 +676,7 @@
           <a:p>
             <a:fld id="{A9C2E571-38F2-4F73-B523-6EB95170224E}" type="datetimeFigureOut">
               <a:rPr lang="en-US" smtClean="0"/>
-              <a:t>11/24/2021</a:t>
+              <a:t>11/30/2021</a:t>
             </a:fld>
             <a:endParaRPr lang="en-US"/>
           </a:p>
@@ -869,7 +874,7 @@
           <a:p>
             <a:fld id="{A9C2E571-38F2-4F73-B523-6EB95170224E}" type="datetimeFigureOut">
               <a:rPr lang="en-US" smtClean="0"/>
-              <a:t>11/24/2021</a:t>
+              <a:t>11/30/2021</a:t>
             </a:fld>
             <a:endParaRPr lang="en-US"/>
           </a:p>
@@ -1144,7 +1149,7 @@
           <a:p>
             <a:fld id="{A9C2E571-38F2-4F73-B523-6EB95170224E}" type="datetimeFigureOut">
               <a:rPr lang="en-US" smtClean="0"/>
-              <a:t>11/24/2021</a:t>
+              <a:t>11/30/2021</a:t>
             </a:fld>
             <a:endParaRPr lang="en-US"/>
           </a:p>
@@ -1409,7 +1414,7 @@
           <a:p>
             <a:fld id="{A9C2E571-38F2-4F73-B523-6EB95170224E}" type="datetimeFigureOut">
               <a:rPr lang="en-US" smtClean="0"/>
-              <a:t>11/24/2021</a:t>
+              <a:t>11/30/2021</a:t>
             </a:fld>
             <a:endParaRPr lang="en-US"/>
           </a:p>
@@ -1821,7 +1826,7 @@
           <a:p>
             <a:fld id="{A9C2E571-38F2-4F73-B523-6EB95170224E}" type="datetimeFigureOut">
               <a:rPr lang="en-US" smtClean="0"/>
-              <a:t>11/24/2021</a:t>
+              <a:t>11/30/2021</a:t>
             </a:fld>
             <a:endParaRPr lang="en-US"/>
           </a:p>
@@ -1962,7 +1967,7 @@
           <a:p>
             <a:fld id="{A9C2E571-38F2-4F73-B523-6EB95170224E}" type="datetimeFigureOut">
               <a:rPr lang="en-US" smtClean="0"/>
-              <a:t>11/24/2021</a:t>
+              <a:t>11/30/2021</a:t>
             </a:fld>
             <a:endParaRPr lang="en-US"/>
           </a:p>
@@ -2075,7 +2080,7 @@
           <a:p>
             <a:fld id="{A9C2E571-38F2-4F73-B523-6EB95170224E}" type="datetimeFigureOut">
               <a:rPr lang="en-US" smtClean="0"/>
-              <a:t>11/24/2021</a:t>
+              <a:t>11/30/2021</a:t>
             </a:fld>
             <a:endParaRPr lang="en-US"/>
           </a:p>
@@ -2386,7 +2391,7 @@
           <a:p>
             <a:fld id="{A9C2E571-38F2-4F73-B523-6EB95170224E}" type="datetimeFigureOut">
               <a:rPr lang="en-US" smtClean="0"/>
-              <a:t>11/24/2021</a:t>
+              <a:t>11/30/2021</a:t>
             </a:fld>
             <a:endParaRPr lang="en-US"/>
           </a:p>
@@ -2674,7 +2679,7 @@
           <a:p>
             <a:fld id="{A9C2E571-38F2-4F73-B523-6EB95170224E}" type="datetimeFigureOut">
               <a:rPr lang="en-US" smtClean="0"/>
-              <a:t>11/24/2021</a:t>
+              <a:t>11/30/2021</a:t>
             </a:fld>
             <a:endParaRPr lang="en-US"/>
           </a:p>
@@ -2915,7 +2920,7 @@
           <a:p>
             <a:fld id="{A9C2E571-38F2-4F73-B523-6EB95170224E}" type="datetimeFigureOut">
               <a:rPr lang="en-US" smtClean="0"/>
-              <a:t>11/24/2021</a:t>
+              <a:t>11/30/2021</a:t>
             </a:fld>
             <a:endParaRPr lang="en-US"/>
           </a:p>
@@ -3362,7 +3367,7 @@
           <a:p>
             <a:r>
               <a:rPr lang="en-US" sz="4400" dirty="0"/>
-              <a:t>Spatial and storm-time dependence of electron microburst pitch angle anisotropy</a:t>
+              <a:t>Spatial and storm-time dependence of electron microburst pitch angle isotropy</a:t>
             </a:r>
           </a:p>
         </p:txBody>
@@ -3440,6 +3445,255 @@
     <p:extLst>
       <p:ext uri="{BB962C8B-B14F-4D97-AF65-F5344CB8AC3E}">
         <p14:creationId xmlns:p14="http://schemas.microsoft.com/office/powerpoint/2010/main" val="79528449"/>
+      </p:ext>
+    </p:extLst>
+  </p:cSld>
+  <p:clrMapOvr>
+    <a:masterClrMapping/>
+  </p:clrMapOvr>
+</p:sld>
+</file>
+
+<file path=ppt/slides/slide10.xml><?xml version="1.0" encoding="utf-8"?>
+<p:sld xmlns:a="http://schemas.openxmlformats.org/drawingml/2006/main" xmlns:r="http://schemas.openxmlformats.org/officeDocument/2006/relationships" xmlns:p="http://schemas.openxmlformats.org/presentationml/2006/main">
+  <p:cSld>
+    <p:spTree>
+      <p:nvGrpSpPr>
+        <p:cNvPr id="1" name=""/>
+        <p:cNvGrpSpPr/>
+        <p:nvPr/>
+      </p:nvGrpSpPr>
+      <p:grpSpPr>
+        <a:xfrm>
+          <a:off x="0" y="0"/>
+          <a:ext cx="0" cy="0"/>
+          <a:chOff x="0" y="0"/>
+          <a:chExt cx="0" cy="0"/>
+        </a:xfrm>
+      </p:grpSpPr>
+      <p:sp>
+        <p:nvSpPr>
+          <p:cNvPr id="2" name="Title 1">
+            <a:extLst>
+              <a:ext uri="{FF2B5EF4-FFF2-40B4-BE49-F238E27FC236}">
+                <a16:creationId xmlns:a16="http://schemas.microsoft.com/office/drawing/2014/main" id="{B9A59FB1-4A16-473F-BA38-A311DCCEA221}"/>
+              </a:ext>
+            </a:extLst>
+          </p:cNvPr>
+          <p:cNvSpPr>
+            <a:spLocks noGrp="1"/>
+          </p:cNvSpPr>
+          <p:nvPr>
+            <p:ph type="title"/>
+          </p:nvPr>
+        </p:nvSpPr>
+        <p:spPr/>
+        <p:txBody>
+          <a:bodyPr/>
+          <a:lstStyle/>
+          <a:p>
+            <a:r>
+              <a:rPr lang="en-US" dirty="0"/>
+              <a:t>Conclusions</a:t>
+            </a:r>
+          </a:p>
+        </p:txBody>
+      </p:sp>
+      <p:sp>
+        <p:nvSpPr>
+          <p:cNvPr id="3" name="Content Placeholder 2">
+            <a:extLst>
+              <a:ext uri="{FF2B5EF4-FFF2-40B4-BE49-F238E27FC236}">
+                <a16:creationId xmlns:a16="http://schemas.microsoft.com/office/drawing/2014/main" id="{30A96749-1A67-422D-A69D-08ED14DF3700}"/>
+              </a:ext>
+            </a:extLst>
+          </p:cNvPr>
+          <p:cNvSpPr>
+            <a:spLocks noGrp="1"/>
+          </p:cNvSpPr>
+          <p:nvPr>
+            <p:ph idx="1"/>
+          </p:nvPr>
+        </p:nvSpPr>
+        <p:spPr/>
+        <p:txBody>
+          <a:bodyPr/>
+          <a:lstStyle/>
+          <a:p>
+            <a:endParaRPr lang="en-US" dirty="0"/>
+          </a:p>
+        </p:txBody>
+      </p:sp>
+    </p:spTree>
+    <p:extLst>
+      <p:ext uri="{BB962C8B-B14F-4D97-AF65-F5344CB8AC3E}">
+        <p14:creationId xmlns:p14="http://schemas.microsoft.com/office/powerpoint/2010/main" val="2128692287"/>
+      </p:ext>
+    </p:extLst>
+  </p:cSld>
+  <p:clrMapOvr>
+    <a:masterClrMapping/>
+  </p:clrMapOvr>
+</p:sld>
+</file>
+
+<file path=ppt/slides/slide11.xml><?xml version="1.0" encoding="utf-8"?>
+<p:sld xmlns:a="http://schemas.openxmlformats.org/drawingml/2006/main" xmlns:r="http://schemas.openxmlformats.org/officeDocument/2006/relationships" xmlns:p="http://schemas.openxmlformats.org/presentationml/2006/main">
+  <p:cSld>
+    <p:spTree>
+      <p:nvGrpSpPr>
+        <p:cNvPr id="1" name=""/>
+        <p:cNvGrpSpPr/>
+        <p:nvPr/>
+      </p:nvGrpSpPr>
+      <p:grpSpPr>
+        <a:xfrm>
+          <a:off x="0" y="0"/>
+          <a:ext cx="0" cy="0"/>
+          <a:chOff x="0" y="0"/>
+          <a:chExt cx="0" cy="0"/>
+        </a:xfrm>
+      </p:grpSpPr>
+      <p:sp>
+        <p:nvSpPr>
+          <p:cNvPr id="2" name="Title 1">
+            <a:extLst>
+              <a:ext uri="{FF2B5EF4-FFF2-40B4-BE49-F238E27FC236}">
+                <a16:creationId xmlns:a16="http://schemas.microsoft.com/office/drawing/2014/main" id="{924F04D8-107D-44F7-8DCC-BBCBE39FFCC0}"/>
+              </a:ext>
+            </a:extLst>
+          </p:cNvPr>
+          <p:cNvSpPr>
+            <a:spLocks noGrp="1"/>
+          </p:cNvSpPr>
+          <p:nvPr>
+            <p:ph type="title"/>
+          </p:nvPr>
+        </p:nvSpPr>
+        <p:spPr/>
+        <p:txBody>
+          <a:bodyPr/>
+          <a:lstStyle/>
+          <a:p>
+            <a:r>
+              <a:rPr lang="en-US" dirty="0"/>
+              <a:t>Acknowledgements</a:t>
+            </a:r>
+          </a:p>
+        </p:txBody>
+      </p:sp>
+      <p:sp>
+        <p:nvSpPr>
+          <p:cNvPr id="3" name="Content Placeholder 2">
+            <a:extLst>
+              <a:ext uri="{FF2B5EF4-FFF2-40B4-BE49-F238E27FC236}">
+                <a16:creationId xmlns:a16="http://schemas.microsoft.com/office/drawing/2014/main" id="{6EAD910A-C7FE-4B83-80F8-E64A5A38B0F3}"/>
+              </a:ext>
+            </a:extLst>
+          </p:cNvPr>
+          <p:cNvSpPr>
+            <a:spLocks noGrp="1"/>
+          </p:cNvSpPr>
+          <p:nvPr>
+            <p:ph idx="1"/>
+          </p:nvPr>
+        </p:nvSpPr>
+        <p:spPr/>
+        <p:txBody>
+          <a:bodyPr/>
+          <a:lstStyle/>
+          <a:p>
+            <a:endParaRPr lang="en-US" dirty="0"/>
+          </a:p>
+        </p:txBody>
+      </p:sp>
+    </p:spTree>
+    <p:extLst>
+      <p:ext uri="{BB962C8B-B14F-4D97-AF65-F5344CB8AC3E}">
+        <p14:creationId xmlns:p14="http://schemas.microsoft.com/office/powerpoint/2010/main" val="2620924740"/>
+      </p:ext>
+    </p:extLst>
+  </p:cSld>
+  <p:clrMapOvr>
+    <a:masterClrMapping/>
+  </p:clrMapOvr>
+</p:sld>
+</file>
+
+<file path=ppt/slides/slide12.xml><?xml version="1.0" encoding="utf-8"?>
+<p:sld xmlns:a="http://schemas.openxmlformats.org/drawingml/2006/main" xmlns:r="http://schemas.openxmlformats.org/officeDocument/2006/relationships" xmlns:p="http://schemas.openxmlformats.org/presentationml/2006/main">
+  <p:cSld>
+    <p:spTree>
+      <p:nvGrpSpPr>
+        <p:cNvPr id="1" name=""/>
+        <p:cNvGrpSpPr/>
+        <p:nvPr/>
+      </p:nvGrpSpPr>
+      <p:grpSpPr>
+        <a:xfrm>
+          <a:off x="0" y="0"/>
+          <a:ext cx="0" cy="0"/>
+          <a:chOff x="0" y="0"/>
+          <a:chExt cx="0" cy="0"/>
+        </a:xfrm>
+      </p:grpSpPr>
+      <p:sp>
+        <p:nvSpPr>
+          <p:cNvPr id="2" name="Title 1">
+            <a:extLst>
+              <a:ext uri="{FF2B5EF4-FFF2-40B4-BE49-F238E27FC236}">
+                <a16:creationId xmlns:a16="http://schemas.microsoft.com/office/drawing/2014/main" id="{EE6B1115-97D4-43B1-AA31-0357D39CAAA4}"/>
+              </a:ext>
+            </a:extLst>
+          </p:cNvPr>
+          <p:cNvSpPr>
+            <a:spLocks noGrp="1"/>
+          </p:cNvSpPr>
+          <p:nvPr>
+            <p:ph type="title"/>
+          </p:nvPr>
+        </p:nvSpPr>
+        <p:spPr/>
+        <p:txBody>
+          <a:bodyPr/>
+          <a:lstStyle/>
+          <a:p>
+            <a:r>
+              <a:rPr lang="en-US" dirty="0"/>
+              <a:t>Extra Info Slide</a:t>
+            </a:r>
+          </a:p>
+        </p:txBody>
+      </p:sp>
+      <p:sp>
+        <p:nvSpPr>
+          <p:cNvPr id="3" name="Content Placeholder 2">
+            <a:extLst>
+              <a:ext uri="{FF2B5EF4-FFF2-40B4-BE49-F238E27FC236}">
+                <a16:creationId xmlns:a16="http://schemas.microsoft.com/office/drawing/2014/main" id="{3A32D76C-8393-450E-BF5E-5FD66A53E436}"/>
+              </a:ext>
+            </a:extLst>
+          </p:cNvPr>
+          <p:cNvSpPr>
+            <a:spLocks noGrp="1"/>
+          </p:cNvSpPr>
+          <p:nvPr>
+            <p:ph idx="1"/>
+          </p:nvPr>
+        </p:nvSpPr>
+        <p:spPr/>
+        <p:txBody>
+          <a:bodyPr/>
+          <a:lstStyle/>
+          <a:p>
+            <a:endParaRPr lang="en-US"/>
+          </a:p>
+        </p:txBody>
+      </p:sp>
+    </p:spTree>
+    <p:extLst>
+      <p:ext uri="{BB962C8B-B14F-4D97-AF65-F5344CB8AC3E}">
+        <p14:creationId xmlns:p14="http://schemas.microsoft.com/office/powerpoint/2010/main" val="3363252619"/>
       </p:ext>
     </p:extLst>
   </p:cSld>
@@ -3529,7 +3783,7 @@
             </a:pPr>
             <a:r>
               <a:rPr lang="en-US" dirty="0"/>
-              <a:t>Science &amp; Mission Background</a:t>
+              <a:t>Introduction</a:t>
             </a:r>
           </a:p>
           <a:p>
@@ -3542,7 +3796,7 @@
             </a:pPr>
             <a:r>
               <a:rPr lang="en-US" dirty="0"/>
-              <a:t>Statistical Year Study</a:t>
+              <a:t>Mission Background</a:t>
             </a:r>
           </a:p>
           <a:p>
@@ -3555,7 +3809,33 @@
             </a:pPr>
             <a:r>
               <a:rPr lang="en-US" dirty="0"/>
+              <a:t>Statistical Year Study</a:t>
+            </a:r>
+          </a:p>
+          <a:p>
+            <a:pPr marL="514350" indent="-514350">
+              <a:lnSpc>
+                <a:spcPct val="150000"/>
+              </a:lnSpc>
+              <a:buFont typeface="+mj-lt"/>
+              <a:buAutoNum type="arabicPeriod"/>
+            </a:pPr>
+            <a:r>
+              <a:rPr lang="en-US" dirty="0"/>
               <a:t>Storm-time Epoch Analysis</a:t>
+            </a:r>
+          </a:p>
+          <a:p>
+            <a:pPr marL="514350" indent="-514350">
+              <a:lnSpc>
+                <a:spcPct val="150000"/>
+              </a:lnSpc>
+              <a:buFont typeface="+mj-lt"/>
+              <a:buAutoNum type="arabicPeriod"/>
+            </a:pPr>
+            <a:r>
+              <a:rPr lang="en-US" dirty="0"/>
+              <a:t>Conclusions</a:t>
             </a:r>
           </a:p>
         </p:txBody>
@@ -3590,12 +3870,48 @@
           <a:chExt cx="0" cy="0"/>
         </a:xfrm>
       </p:grpSpPr>
+      <p:pic>
+        <p:nvPicPr>
+          <p:cNvPr id="16" name="Picture 15" descr="A picture containing compact disk, electronics&#10;&#10;Description automatically generated">
+            <a:extLst>
+              <a:ext uri="{FF2B5EF4-FFF2-40B4-BE49-F238E27FC236}">
+                <a16:creationId xmlns:a16="http://schemas.microsoft.com/office/drawing/2014/main" id="{0AB513A7-9B32-40D5-B7FB-71893C42F1CA}"/>
+              </a:ext>
+            </a:extLst>
+          </p:cNvPr>
+          <p:cNvPicPr>
+            <a:picLocks noChangeAspect="1"/>
+          </p:cNvPicPr>
+          <p:nvPr/>
+        </p:nvPicPr>
+        <p:blipFill>
+          <a:blip r:embed="rId2">
+            <a:extLst>
+              <a:ext uri="{28A0092B-C50C-407E-A947-70E740481C1C}">
+                <a14:useLocalDpi xmlns:a14="http://schemas.microsoft.com/office/drawing/2010/main" val="0"/>
+              </a:ext>
+            </a:extLst>
+          </a:blip>
+          <a:stretch>
+            <a:fillRect/>
+          </a:stretch>
+        </p:blipFill>
+        <p:spPr>
+          <a:xfrm>
+            <a:off x="481926" y="3594141"/>
+            <a:ext cx="5509513" cy="3099101"/>
+          </a:xfrm>
+          <a:prstGeom prst="rect">
+            <a:avLst/>
+          </a:prstGeom>
+        </p:spPr>
+      </p:pic>
       <p:sp>
         <p:nvSpPr>
           <p:cNvPr id="2" name="Title 1">
             <a:extLst>
               <a:ext uri="{FF2B5EF4-FFF2-40B4-BE49-F238E27FC236}">
-                <a16:creationId xmlns:a16="http://schemas.microsoft.com/office/drawing/2014/main" id="{CDA84980-AF52-4AA0-B0A2-736C0E64884E}"/>
+                <a16:creationId xmlns:a16="http://schemas.microsoft.com/office/drawing/2014/main" id="{65D9F104-4356-4013-9A24-3E83247BFF9D}"/>
               </a:ext>
             </a:extLst>
           </p:cNvPr>
@@ -3606,47 +3922,433 @@
             <p:ph type="title"/>
           </p:nvPr>
         </p:nvSpPr>
-        <p:spPr/>
+        <p:spPr>
+          <a:xfrm>
+            <a:off x="527480" y="20275"/>
+            <a:ext cx="10515600" cy="1325563"/>
+          </a:xfrm>
+        </p:spPr>
         <p:txBody>
           <a:bodyPr/>
           <a:lstStyle/>
           <a:p>
             <a:r>
               <a:rPr lang="en-US" dirty="0"/>
-              <a:t>Science Background</a:t>
-            </a:r>
-          </a:p>
-        </p:txBody>
-      </p:sp>
-      <p:sp>
-        <p:nvSpPr>
-          <p:cNvPr id="3" name="Content Placeholder 2">
-            <a:extLst>
-              <a:ext uri="{FF2B5EF4-FFF2-40B4-BE49-F238E27FC236}">
-                <a16:creationId xmlns:a16="http://schemas.microsoft.com/office/drawing/2014/main" id="{99498240-CA36-4B73-9DF0-ABB07F9A9A52}"/>
-              </a:ext>
-            </a:extLst>
-          </p:cNvPr>
-          <p:cNvSpPr>
-            <a:spLocks noGrp="1"/>
-          </p:cNvSpPr>
+              <a:t>Introduction</a:t>
+            </a:r>
+          </a:p>
+        </p:txBody>
+      </p:sp>
+      <p:pic>
+        <p:nvPicPr>
+          <p:cNvPr id="5" name="Content Placeholder 4" descr="Diagram&#10;&#10;Description automatically generated">
+            <a:extLst>
+              <a:ext uri="{FF2B5EF4-FFF2-40B4-BE49-F238E27FC236}">
+                <a16:creationId xmlns:a16="http://schemas.microsoft.com/office/drawing/2014/main" id="{EB4EF867-3209-410F-8886-9E18FA30AED4}"/>
+              </a:ext>
+            </a:extLst>
+          </p:cNvPr>
+          <p:cNvPicPr>
+            <a:picLocks noGrp="1" noChangeAspect="1"/>
+          </p:cNvPicPr>
           <p:nvPr>
             <p:ph idx="1"/>
           </p:nvPr>
-        </p:nvSpPr>
-        <p:spPr/>
-        <p:txBody>
-          <a:bodyPr/>
-          <a:lstStyle/>
-          <a:p>
-            <a:endParaRPr lang="en-US"/>
-          </a:p>
-        </p:txBody>
-      </p:sp>
+        </p:nvPicPr>
+        <p:blipFill>
+          <a:blip r:embed="rId3">
+            <a:extLst>
+              <a:ext uri="{28A0092B-C50C-407E-A947-70E740481C1C}">
+                <a14:useLocalDpi xmlns:a14="http://schemas.microsoft.com/office/drawing/2010/main" val="0"/>
+              </a:ext>
+            </a:extLst>
+          </a:blip>
+          <a:stretch>
+            <a:fillRect/>
+          </a:stretch>
+        </p:blipFill>
+        <p:spPr>
+          <a:xfrm>
+            <a:off x="3951215" y="5100875"/>
+            <a:ext cx="1943122" cy="1363085"/>
+          </a:xfrm>
+          <a:ln w="28575">
+            <a:solidFill>
+              <a:schemeClr val="tx1"/>
+            </a:solidFill>
+          </a:ln>
+        </p:spPr>
+      </p:pic>
+      <p:grpSp>
+        <p:nvGrpSpPr>
+          <p:cNvPr id="6" name="Group 5">
+            <a:extLst>
+              <a:ext uri="{FF2B5EF4-FFF2-40B4-BE49-F238E27FC236}">
+                <a16:creationId xmlns:a16="http://schemas.microsoft.com/office/drawing/2014/main" id="{BC478F4E-7B40-46A3-B17F-3E95FFDD556C}"/>
+              </a:ext>
+            </a:extLst>
+          </p:cNvPr>
+          <p:cNvGrpSpPr/>
+          <p:nvPr/>
+        </p:nvGrpSpPr>
+        <p:grpSpPr>
+          <a:xfrm>
+            <a:off x="6684886" y="408222"/>
+            <a:ext cx="5507114" cy="2719078"/>
+            <a:chOff x="2316648" y="1600200"/>
+            <a:chExt cx="6617012" cy="3419105"/>
+          </a:xfrm>
+        </p:grpSpPr>
+        <p:pic>
+          <p:nvPicPr>
+            <p:cNvPr id="7" name="Picture 6" descr="JSample Thesis UCB 2013.pdf">
+              <a:extLst>
+                <a:ext uri="{FF2B5EF4-FFF2-40B4-BE49-F238E27FC236}">
+                  <a16:creationId xmlns:a16="http://schemas.microsoft.com/office/drawing/2014/main" id="{962670AD-96CB-4506-BFF7-8C5F85AC4367}"/>
+                </a:ext>
+              </a:extLst>
+            </p:cNvPr>
+            <p:cNvPicPr>
+              <a:picLocks noChangeAspect="1"/>
+            </p:cNvPicPr>
+            <p:nvPr/>
+          </p:nvPicPr>
+          <p:blipFill>
+            <a:blip r:embed="rId4">
+              <a:extLst>
+                <a:ext uri="{28A0092B-C50C-407E-A947-70E740481C1C}">
+                  <a14:useLocalDpi xmlns:a14="http://schemas.microsoft.com/office/drawing/2010/main"/>
+                </a:ext>
+              </a:extLst>
+            </a:blip>
+            <a:srcRect l="20254" t="61792" r="19643" b="15206"/>
+            <a:stretch>
+              <a:fillRect/>
+            </a:stretch>
+          </p:blipFill>
+          <p:spPr>
+            <a:xfrm>
+              <a:off x="2316648" y="1600200"/>
+              <a:ext cx="6370152" cy="3154935"/>
+            </a:xfrm>
+            <a:prstGeom prst="rect">
+              <a:avLst/>
+            </a:prstGeom>
+            <a:ln>
+              <a:solidFill>
+                <a:schemeClr val="tx1"/>
+              </a:solidFill>
+            </a:ln>
+          </p:spPr>
+        </p:pic>
+        <p:sp>
+          <p:nvSpPr>
+            <p:cNvPr id="8" name="TextBox 7">
+              <a:extLst>
+                <a:ext uri="{FF2B5EF4-FFF2-40B4-BE49-F238E27FC236}">
+                  <a16:creationId xmlns:a16="http://schemas.microsoft.com/office/drawing/2014/main" id="{951B5A75-5FD4-43DE-8CC7-DFAB6CB96860}"/>
+                </a:ext>
+              </a:extLst>
+            </p:cNvPr>
+            <p:cNvSpPr txBox="1">
+              <a:spLocks noChangeArrowheads="1"/>
+            </p:cNvSpPr>
+            <p:nvPr/>
+          </p:nvSpPr>
+          <p:spPr bwMode="auto">
+            <a:xfrm>
+              <a:off x="6794132" y="4755135"/>
+              <a:ext cx="2139528" cy="264170"/>
+            </a:xfrm>
+            <a:prstGeom prst="rect">
+              <a:avLst/>
+            </a:prstGeom>
+            <a:noFill/>
+            <a:ln w="9525">
+              <a:noFill/>
+              <a:miter lim="800000"/>
+              <a:headEnd/>
+              <a:tailEnd/>
+            </a:ln>
+          </p:spPr>
+          <p:txBody>
+            <a:bodyPr wrap="square">
+              <a:prstTxWarp prst="textNoShape">
+                <a:avLst/>
+              </a:prstTxWarp>
+              <a:spAutoFit/>
+            </a:bodyPr>
+            <a:lstStyle/>
+            <a:p>
+              <a:r>
+                <a:rPr lang="en-US" sz="1000" dirty="0">
+                  <a:solidFill>
+                    <a:srgbClr val="404040"/>
+                  </a:solidFill>
+                  <a:latin typeface="Optima"/>
+                  <a:cs typeface="Optima"/>
+                </a:rPr>
+                <a:t>J. Sample, PhD Thesis (2013)</a:t>
+              </a:r>
+            </a:p>
+          </p:txBody>
+        </p:sp>
+      </p:grpSp>
+      <p:sp>
+        <p:nvSpPr>
+          <p:cNvPr id="10" name="TextBox 9">
+            <a:extLst>
+              <a:ext uri="{FF2B5EF4-FFF2-40B4-BE49-F238E27FC236}">
+                <a16:creationId xmlns:a16="http://schemas.microsoft.com/office/drawing/2014/main" id="{4A0D5F09-9C11-4542-9FE1-365EB89DA488}"/>
+              </a:ext>
+            </a:extLst>
+          </p:cNvPr>
+          <p:cNvSpPr txBox="1"/>
+          <p:nvPr/>
+        </p:nvSpPr>
+        <p:spPr>
+          <a:xfrm>
+            <a:off x="4624523" y="6463960"/>
+            <a:ext cx="1529875" cy="246221"/>
+          </a:xfrm>
+          <a:prstGeom prst="rect">
+            <a:avLst/>
+          </a:prstGeom>
+          <a:noFill/>
+        </p:spPr>
+        <p:txBody>
+          <a:bodyPr wrap="square">
+            <a:spAutoFit/>
+          </a:bodyPr>
+          <a:lstStyle/>
+          <a:p>
+            <a:r>
+              <a:rPr lang="en-US" sz="1000" dirty="0">
+                <a:solidFill>
+                  <a:schemeClr val="bg1"/>
+                </a:solidFill>
+              </a:rPr>
+              <a:t>(From Yuting Ng, 2013)</a:t>
+            </a:r>
+          </a:p>
+        </p:txBody>
+      </p:sp>
+      <p:sp>
+        <p:nvSpPr>
+          <p:cNvPr id="17" name="TextBox 16">
+            <a:extLst>
+              <a:ext uri="{FF2B5EF4-FFF2-40B4-BE49-F238E27FC236}">
+                <a16:creationId xmlns:a16="http://schemas.microsoft.com/office/drawing/2014/main" id="{1EDF7C88-3186-429E-B7DA-317086838DF6}"/>
+              </a:ext>
+            </a:extLst>
+          </p:cNvPr>
+          <p:cNvSpPr txBox="1"/>
+          <p:nvPr/>
+        </p:nvSpPr>
+        <p:spPr>
+          <a:xfrm>
+            <a:off x="4922776" y="6658023"/>
+            <a:ext cx="1173224" cy="246221"/>
+          </a:xfrm>
+          <a:prstGeom prst="rect">
+            <a:avLst/>
+          </a:prstGeom>
+          <a:noFill/>
+        </p:spPr>
+        <p:txBody>
+          <a:bodyPr wrap="square">
+            <a:spAutoFit/>
+          </a:bodyPr>
+          <a:lstStyle/>
+          <a:p>
+            <a:r>
+              <a:rPr lang="en-US" sz="1000" dirty="0"/>
+              <a:t>(From Wikipedia)</a:t>
+            </a:r>
+          </a:p>
+        </p:txBody>
+      </p:sp>
+      <p:sp>
+        <p:nvSpPr>
+          <p:cNvPr id="18" name="TextBox 17">
+            <a:extLst>
+              <a:ext uri="{FF2B5EF4-FFF2-40B4-BE49-F238E27FC236}">
+                <a16:creationId xmlns:a16="http://schemas.microsoft.com/office/drawing/2014/main" id="{76ECA605-F1B8-453A-9B57-CB627D2A47AF}"/>
+              </a:ext>
+            </a:extLst>
+          </p:cNvPr>
+          <p:cNvSpPr txBox="1"/>
+          <p:nvPr/>
+        </p:nvSpPr>
+        <p:spPr>
+          <a:xfrm>
+            <a:off x="757185" y="1044036"/>
+            <a:ext cx="5234254" cy="2462213"/>
+          </a:xfrm>
+          <a:prstGeom prst="rect">
+            <a:avLst/>
+          </a:prstGeom>
+          <a:noFill/>
+        </p:spPr>
+        <p:txBody>
+          <a:bodyPr wrap="square">
+            <a:spAutoFit/>
+          </a:bodyPr>
+          <a:lstStyle/>
+          <a:p>
+            <a:pPr marL="285750" indent="-285750">
+              <a:buFont typeface="Arial" panose="020B0604020202020204" pitchFamily="34" charset="0"/>
+              <a:buChar char="•"/>
+            </a:pPr>
+            <a:r>
+              <a:rPr lang="en-US" sz="1400" dirty="0"/>
+              <a:t>The Earth’s radiation belts are composed of electrons interacting with the planetary magnetic field in 3 main motions:</a:t>
+            </a:r>
+          </a:p>
+          <a:p>
+            <a:pPr marL="800100" lvl="1" indent="-342900">
+              <a:buAutoNum type="arabicParenR"/>
+            </a:pPr>
+            <a:r>
+              <a:rPr lang="en-US" sz="1400" dirty="0"/>
+              <a:t>Gyro motion (~1 </a:t>
+            </a:r>
+            <a:r>
+              <a:rPr lang="en-US" sz="1400" dirty="0" err="1"/>
+              <a:t>ms</a:t>
+            </a:r>
+            <a:r>
+              <a:rPr lang="en-US" sz="1400" dirty="0"/>
+              <a:t>)</a:t>
+            </a:r>
+          </a:p>
+          <a:p>
+            <a:pPr marL="800100" lvl="1" indent="-342900">
+              <a:buAutoNum type="arabicParenR"/>
+            </a:pPr>
+            <a:r>
+              <a:rPr lang="en-US" sz="1400" dirty="0"/>
+              <a:t>Bounce motion (~0.1-1.0 s)</a:t>
+            </a:r>
+          </a:p>
+          <a:p>
+            <a:pPr marL="800100" lvl="1" indent="-342900">
+              <a:buAutoNum type="arabicParenR"/>
+            </a:pPr>
+            <a:r>
+              <a:rPr lang="en-US" sz="1400" dirty="0"/>
+              <a:t>Drift motion (~1-10 min)</a:t>
+            </a:r>
+          </a:p>
+          <a:p>
+            <a:pPr marL="285750" indent="-285750">
+              <a:buFont typeface="Arial" panose="020B0604020202020204" pitchFamily="34" charset="0"/>
+              <a:buChar char="•"/>
+            </a:pPr>
+            <a:r>
+              <a:rPr lang="en-US" sz="1400" dirty="0"/>
+              <a:t>Electrons with </a:t>
+            </a:r>
+            <a:r>
+              <a:rPr lang="en-US" sz="1400" u="sng" dirty="0"/>
+              <a:t>small</a:t>
+            </a:r>
+            <a:r>
+              <a:rPr lang="en-US" sz="1400" dirty="0"/>
+              <a:t> velocity pitch angles will more likely precipitate into the atmosphere before bouncing</a:t>
+            </a:r>
+          </a:p>
+          <a:p>
+            <a:pPr marL="285750" indent="-285750">
+              <a:buFont typeface="Arial" panose="020B0604020202020204" pitchFamily="34" charset="0"/>
+              <a:buChar char="•"/>
+            </a:pPr>
+            <a:r>
+              <a:rPr lang="en-US" sz="1400" dirty="0"/>
+              <a:t>Pitch angle isotropy is defined by how electron population velocity pitch angles are distributed:</a:t>
+            </a:r>
+          </a:p>
+          <a:p>
+            <a:pPr marL="742950" lvl="1" indent="-285750">
+              <a:buFont typeface="Arial" panose="020B0604020202020204" pitchFamily="34" charset="0"/>
+              <a:buChar char="•"/>
+            </a:pPr>
+            <a:r>
+              <a:rPr lang="en-US" sz="1400" u="sng" dirty="0"/>
+              <a:t>Isotropic: </a:t>
+            </a:r>
+            <a:r>
+              <a:rPr lang="en-US" sz="1400" dirty="0"/>
+              <a:t>Pitch angles are pointed everywhere equally</a:t>
+            </a:r>
+          </a:p>
+          <a:p>
+            <a:pPr marL="742950" lvl="1" indent="-285750">
+              <a:buFont typeface="Arial" panose="020B0604020202020204" pitchFamily="34" charset="0"/>
+              <a:buChar char="•"/>
+            </a:pPr>
+            <a:r>
+              <a:rPr lang="en-US" sz="1400" u="sng" dirty="0"/>
+              <a:t>Anisotropic: </a:t>
+            </a:r>
+            <a:r>
+              <a:rPr lang="en-US" sz="1400" dirty="0"/>
+              <a:t>Pitch angles are pointed unevenly </a:t>
+            </a:r>
+          </a:p>
+        </p:txBody>
+      </p:sp>
+      <p:pic>
+        <p:nvPicPr>
+          <p:cNvPr id="3078" name="Picture 6">
+            <a:extLst>
+              <a:ext uri="{FF2B5EF4-FFF2-40B4-BE49-F238E27FC236}">
+                <a16:creationId xmlns:a16="http://schemas.microsoft.com/office/drawing/2014/main" id="{58B1E53E-53BC-4C6C-9D6A-3356EB5BE1F5}"/>
+              </a:ext>
+            </a:extLst>
+          </p:cNvPr>
+          <p:cNvPicPr>
+            <a:picLocks noChangeAspect="1" noChangeArrowheads="1"/>
+          </p:cNvPicPr>
+          <p:nvPr/>
+        </p:nvPicPr>
+        <p:blipFill>
+          <a:blip r:embed="rId5">
+            <a:extLst>
+              <a:ext uri="{28A0092B-C50C-407E-A947-70E740481C1C}">
+                <a14:useLocalDpi xmlns:a14="http://schemas.microsoft.com/office/drawing/2010/main" val="0"/>
+              </a:ext>
+            </a:extLst>
+          </a:blip>
+          <a:srcRect/>
+          <a:stretch>
+            <a:fillRect/>
+          </a:stretch>
+        </p:blipFill>
+        <p:spPr bwMode="auto">
+          <a:xfrm>
+            <a:off x="6813670" y="3183934"/>
+            <a:ext cx="4488002" cy="3509308"/>
+          </a:xfrm>
+          <a:prstGeom prst="rect">
+            <a:avLst/>
+          </a:prstGeom>
+          <a:noFill/>
+          <a:extLst>
+            <a:ext uri="{909E8E84-426E-40DD-AFC4-6F175D3DCCD1}">
+              <a14:hiddenFill xmlns:a14="http://schemas.microsoft.com/office/drawing/2010/main">
+                <a:solidFill>
+                  <a:srgbClr val="FFFFFF"/>
+                </a:solidFill>
+              </a14:hiddenFill>
+            </a:ext>
+          </a:extLst>
+        </p:spPr>
+      </p:pic>
     </p:spTree>
     <p:extLst>
       <p:ext uri="{BB962C8B-B14F-4D97-AF65-F5344CB8AC3E}">
-        <p14:creationId xmlns:p14="http://schemas.microsoft.com/office/powerpoint/2010/main" val="1081517717"/>
+        <p14:creationId xmlns:p14="http://schemas.microsoft.com/office/powerpoint/2010/main" val="3222086888"/>
       </p:ext>
     </p:extLst>
   </p:cSld>
@@ -3673,45 +4375,12 @@
           <a:chExt cx="0" cy="0"/>
         </a:xfrm>
       </p:grpSpPr>
-      <p:sp>
-        <p:nvSpPr>
-          <p:cNvPr id="2" name="Title 1">
-            <a:extLst>
-              <a:ext uri="{FF2B5EF4-FFF2-40B4-BE49-F238E27FC236}">
-                <a16:creationId xmlns:a16="http://schemas.microsoft.com/office/drawing/2014/main" id="{B0B672F6-6363-456A-BAA8-77C02F2E0E06}"/>
-              </a:ext>
-            </a:extLst>
-          </p:cNvPr>
-          <p:cNvSpPr>
-            <a:spLocks noGrp="1"/>
-          </p:cNvSpPr>
-          <p:nvPr>
-            <p:ph type="title"/>
-          </p:nvPr>
-        </p:nvSpPr>
-        <p:spPr>
-          <a:xfrm>
-            <a:off x="473892" y="44325"/>
-            <a:ext cx="10515600" cy="1325563"/>
-          </a:xfrm>
-        </p:spPr>
-        <p:txBody>
-          <a:bodyPr/>
-          <a:lstStyle/>
-          <a:p>
-            <a:r>
-              <a:rPr lang="en-US" dirty="0"/>
-              <a:t>Mission Background</a:t>
-            </a:r>
-          </a:p>
-        </p:txBody>
-      </p:sp>
       <p:pic>
         <p:nvPicPr>
-          <p:cNvPr id="5" name="Content Placeholder 4" descr="Diagram, engineering drawing&#10;&#10;Description automatically generated">
-            <a:extLst>
-              <a:ext uri="{FF2B5EF4-FFF2-40B4-BE49-F238E27FC236}">
-                <a16:creationId xmlns:a16="http://schemas.microsoft.com/office/drawing/2014/main" id="{7EF509C8-DEC4-4B94-B2B3-587F614D7D2A}"/>
+          <p:cNvPr id="4" name="Content Placeholder 3">
+            <a:extLst>
+              <a:ext uri="{FF2B5EF4-FFF2-40B4-BE49-F238E27FC236}">
+                <a16:creationId xmlns:a16="http://schemas.microsoft.com/office/drawing/2014/main" id="{5187077F-B6DC-4B0E-A5D0-DD7AC45A41B8}"/>
               </a:ext>
             </a:extLst>
           </p:cNvPr>
@@ -3736,60 +4405,17 @@
         </p:blipFill>
         <p:spPr>
           <a:xfrm>
-            <a:off x="6917648" y="304571"/>
-            <a:ext cx="3717710" cy="2772233"/>
+            <a:off x="5977441" y="3791873"/>
+            <a:ext cx="3813721" cy="2781473"/>
           </a:xfrm>
         </p:spPr>
       </p:pic>
-      <p:sp>
-        <p:nvSpPr>
-          <p:cNvPr id="6" name="TextBox 5">
-            <a:extLst>
-              <a:ext uri="{FF2B5EF4-FFF2-40B4-BE49-F238E27FC236}">
-                <a16:creationId xmlns:a16="http://schemas.microsoft.com/office/drawing/2014/main" id="{DA86CB2C-7652-4A5D-B934-4A9BD8C54DA6}"/>
-              </a:ext>
-            </a:extLst>
-          </p:cNvPr>
-          <p:cNvSpPr txBox="1"/>
-          <p:nvPr/>
-        </p:nvSpPr>
-        <p:spPr>
-          <a:xfrm>
-            <a:off x="9157200" y="3076804"/>
-            <a:ext cx="1529875" cy="246221"/>
-          </a:xfrm>
-          <a:prstGeom prst="rect">
-            <a:avLst/>
-          </a:prstGeom>
-          <a:noFill/>
-        </p:spPr>
-        <p:txBody>
-          <a:bodyPr wrap="square">
-            <a:spAutoFit/>
-          </a:bodyPr>
-          <a:lstStyle/>
-          <a:p>
-            <a:r>
-              <a:rPr lang="en-US" sz="1000" dirty="0"/>
-              <a:t>(From </a:t>
-            </a:r>
-            <a:r>
-              <a:rPr lang="en-US" sz="1000" dirty="0" err="1"/>
-              <a:t>eoPortal</a:t>
-            </a:r>
-            <a:r>
-              <a:rPr lang="en-US" sz="1000" dirty="0"/>
-              <a:t> Directory)</a:t>
-            </a:r>
-          </a:p>
-        </p:txBody>
-      </p:sp>
       <p:pic>
         <p:nvPicPr>
-          <p:cNvPr id="8" name="Picture 7" descr="Diagram&#10;&#10;Description automatically generated">
-            <a:extLst>
-              <a:ext uri="{FF2B5EF4-FFF2-40B4-BE49-F238E27FC236}">
-                <a16:creationId xmlns:a16="http://schemas.microsoft.com/office/drawing/2014/main" id="{07C04188-D7EF-4CB1-8F66-AAA674C67F0E}"/>
+          <p:cNvPr id="5" name="Picture 4">
+            <a:extLst>
+              <a:ext uri="{FF2B5EF4-FFF2-40B4-BE49-F238E27FC236}">
+                <a16:creationId xmlns:a16="http://schemas.microsoft.com/office/drawing/2014/main" id="{FC54CD10-999D-4B1A-BCA8-925517469D35}"/>
               </a:ext>
             </a:extLst>
           </p:cNvPr>
@@ -3812,25 +4438,20 @@
         </p:blipFill>
         <p:spPr>
           <a:xfrm>
-            <a:off x="473892" y="2819975"/>
-            <a:ext cx="5021802" cy="3660469"/>
+            <a:off x="332764" y="4050087"/>
+            <a:ext cx="4398627" cy="2384065"/>
           </a:xfrm>
           <a:prstGeom prst="rect">
             <a:avLst/>
           </a:prstGeom>
-          <a:ln w="28575">
-            <a:solidFill>
-              <a:schemeClr val="tx1"/>
-            </a:solidFill>
-          </a:ln>
         </p:spPr>
       </p:pic>
       <p:sp>
         <p:nvSpPr>
-          <p:cNvPr id="9" name="TextBox 8">
-            <a:extLst>
-              <a:ext uri="{FF2B5EF4-FFF2-40B4-BE49-F238E27FC236}">
-                <a16:creationId xmlns:a16="http://schemas.microsoft.com/office/drawing/2014/main" id="{E2F96CA7-F55B-4060-9BCA-3FD5C877A1A1}"/>
+          <p:cNvPr id="6" name="TextBox 5">
+            <a:extLst>
+              <a:ext uri="{FF2B5EF4-FFF2-40B4-BE49-F238E27FC236}">
+                <a16:creationId xmlns:a16="http://schemas.microsoft.com/office/drawing/2014/main" id="{2CE7D87D-680A-4210-8AE0-A62DAD2258B7}"/>
               </a:ext>
             </a:extLst>
           </p:cNvPr>
@@ -3839,8 +4460,8 @@
         </p:nvSpPr>
         <p:spPr>
           <a:xfrm>
-            <a:off x="473892" y="6480444"/>
-            <a:ext cx="1529875" cy="246221"/>
+            <a:off x="8914442" y="6573346"/>
+            <a:ext cx="939690" cy="246221"/>
           </a:xfrm>
           <a:prstGeom prst="rect">
             <a:avLst/>
@@ -3855,17 +4476,17 @@
           <a:p>
             <a:r>
               <a:rPr lang="en-US" sz="1000" dirty="0"/>
-              <a:t>(From Blake et al, 1996)</a:t>
-            </a:r>
-          </a:p>
-        </p:txBody>
-      </p:sp>
-      <p:sp>
-        <p:nvSpPr>
-          <p:cNvPr id="10" name="TextBox 9">
-            <a:extLst>
-              <a:ext uri="{FF2B5EF4-FFF2-40B4-BE49-F238E27FC236}">
-                <a16:creationId xmlns:a16="http://schemas.microsoft.com/office/drawing/2014/main" id="{6747903C-31A9-43DC-A85C-CEF2EC4F4DA2}"/>
+              <a:t>(From NASA)</a:t>
+            </a:r>
+          </a:p>
+        </p:txBody>
+      </p:sp>
+      <p:sp>
+        <p:nvSpPr>
+          <p:cNvPr id="7" name="TextBox 6">
+            <a:extLst>
+              <a:ext uri="{FF2B5EF4-FFF2-40B4-BE49-F238E27FC236}">
+                <a16:creationId xmlns:a16="http://schemas.microsoft.com/office/drawing/2014/main" id="{E4D888A8-BB87-48DC-91CD-957A829E3E3B}"/>
               </a:ext>
             </a:extLst>
           </p:cNvPr>
@@ -3874,8 +4495,8 @@
         </p:nvSpPr>
         <p:spPr>
           <a:xfrm>
-            <a:off x="739430" y="1113767"/>
-            <a:ext cx="5234254" cy="1600438"/>
+            <a:off x="3277559" y="6335310"/>
+            <a:ext cx="1701690" cy="246221"/>
           </a:xfrm>
           <a:prstGeom prst="rect">
             <a:avLst/>
@@ -3888,33 +4509,49 @@
           </a:bodyPr>
           <a:lstStyle/>
           <a:p>
-            <a:pPr marL="285750" indent="-285750">
-              <a:buFont typeface="Arial" panose="020B0604020202020204" pitchFamily="34" charset="0"/>
-              <a:buChar char="•"/>
-            </a:pPr>
-            <a:r>
-              <a:rPr lang="en-US" sz="1400" dirty="0"/>
-              <a:t>The Solar Anomalous and Magnetospheric Particle Explorer (SAMPEX) satellite collected information about particles in the Earth’s radiation belts in near polar orbit from 1992-2004</a:t>
-            </a:r>
-          </a:p>
-          <a:p>
-            <a:pPr marL="285750" indent="-285750">
-              <a:buFont typeface="Arial" panose="020B0604020202020204" pitchFamily="34" charset="0"/>
-              <a:buChar char="•"/>
-            </a:pPr>
-            <a:r>
-              <a:rPr lang="en-US" sz="1400" dirty="0"/>
-              <a:t>The Heavy Ion Large Telescope (HILT) instrument onboard the SAMPEX satellite consisted of 4x4 Silicon detector array that recorded &gt;1 MeV electron counts in high latitude regions of the magnetosphere</a:t>
-            </a:r>
-          </a:p>
-        </p:txBody>
-      </p:sp>
-      <p:sp>
-        <p:nvSpPr>
-          <p:cNvPr id="11" name="TextBox 10">
-            <a:extLst>
-              <a:ext uri="{FF2B5EF4-FFF2-40B4-BE49-F238E27FC236}">
-                <a16:creationId xmlns:a16="http://schemas.microsoft.com/office/drawing/2014/main" id="{46B85775-BB5C-4970-A4A6-F7755AA82B82}"/>
+            <a:r>
+              <a:rPr lang="en-US" sz="1000" dirty="0"/>
+              <a:t>(From Blum et al, 2015)</a:t>
+            </a:r>
+          </a:p>
+        </p:txBody>
+      </p:sp>
+      <p:pic>
+        <p:nvPicPr>
+          <p:cNvPr id="8" name="Picture 7">
+            <a:extLst>
+              <a:ext uri="{FF2B5EF4-FFF2-40B4-BE49-F238E27FC236}">
+                <a16:creationId xmlns:a16="http://schemas.microsoft.com/office/drawing/2014/main" id="{56EE0AB1-6317-44D5-8C12-0481E61C3164}"/>
+              </a:ext>
+            </a:extLst>
+          </p:cNvPr>
+          <p:cNvPicPr>
+            <a:picLocks noChangeAspect="1"/>
+          </p:cNvPicPr>
+          <p:nvPr/>
+        </p:nvPicPr>
+        <p:blipFill>
+          <a:blip r:embed="rId4"/>
+          <a:stretch>
+            <a:fillRect/>
+          </a:stretch>
+        </p:blipFill>
+        <p:spPr>
+          <a:xfrm>
+            <a:off x="6330031" y="528387"/>
+            <a:ext cx="3524101" cy="2844440"/>
+          </a:xfrm>
+          <a:prstGeom prst="rect">
+            <a:avLst/>
+          </a:prstGeom>
+        </p:spPr>
+      </p:pic>
+      <p:sp>
+        <p:nvSpPr>
+          <p:cNvPr id="9" name="TextBox 8">
+            <a:extLst>
+              <a:ext uri="{FF2B5EF4-FFF2-40B4-BE49-F238E27FC236}">
+                <a16:creationId xmlns:a16="http://schemas.microsoft.com/office/drawing/2014/main" id="{6F86872B-9AB0-4DE9-9E26-3509E6D51E7C}"/>
               </a:ext>
             </a:extLst>
           </p:cNvPr>
@@ -3923,8 +4560,8 @@
         </p:nvSpPr>
         <p:spPr>
           <a:xfrm>
-            <a:off x="6096000" y="3534976"/>
-            <a:ext cx="5021802" cy="2677656"/>
+            <a:off x="8241666" y="3249717"/>
+            <a:ext cx="1701690" cy="246221"/>
           </a:xfrm>
           <a:prstGeom prst="rect">
             <a:avLst/>
@@ -3937,61 +4574,63 @@
           </a:bodyPr>
           <a:lstStyle/>
           <a:p>
-            <a:pPr marL="285750" indent="-285750">
-              <a:buFont typeface="Arial" panose="020B0604020202020204" pitchFamily="34" charset="0"/>
-              <a:buChar char="•"/>
-            </a:pPr>
-            <a:r>
-              <a:rPr lang="en-US" sz="1400" dirty="0"/>
-              <a:t>When anisotropic populations of electrons are collected by the HILT instrument, the geometry of the detector rows will cause differences in the total electron counts detected across the array.</a:t>
-            </a:r>
-          </a:p>
-          <a:p>
-            <a:pPr marL="285750" indent="-285750">
-              <a:buFont typeface="Arial" panose="020B0604020202020204" pitchFamily="34" charset="0"/>
-              <a:buChar char="•"/>
-            </a:pPr>
-            <a:r>
-              <a:rPr lang="en-US" sz="1400" dirty="0"/>
-              <a:t>Conversely when isotropic populations of electrons are collected by the HILT instrument, the total electron counts detected will be similar across the array.</a:t>
-            </a:r>
-          </a:p>
-          <a:p>
-            <a:pPr marL="285750" indent="-285750">
-              <a:buFont typeface="Arial" panose="020B0604020202020204" pitchFamily="34" charset="0"/>
-              <a:buChar char="•"/>
-            </a:pPr>
-            <a:r>
-              <a:rPr lang="en-US" sz="1400" dirty="0"/>
-              <a:t>By taking the ratio of electron counts from Row 1 (SSD1) and Row 4 (SSD4) of the detectors,  a measure of </a:t>
-            </a:r>
-            <a:r>
-              <a:rPr lang="en-US" sz="1400" u="sng" dirty="0"/>
-              <a:t>pitch angle isotropy</a:t>
-            </a:r>
-            <a:r>
-              <a:rPr lang="en-US" sz="1400" dirty="0"/>
-              <a:t> can be determined, where:</a:t>
-            </a:r>
-          </a:p>
-          <a:p>
-            <a:pPr marL="742950" lvl="1" indent="-285750">
-              <a:buFont typeface="Arial" panose="020B0604020202020204" pitchFamily="34" charset="0"/>
-              <a:buChar char="•"/>
-            </a:pPr>
-            <a:r>
-              <a:rPr lang="en-US" sz="1400" dirty="0"/>
-              <a:t>Iso = 0  -&gt;  Anisotropic</a:t>
-            </a:r>
-          </a:p>
-          <a:p>
-            <a:pPr marL="742950" lvl="1" indent="-285750">
-              <a:buFont typeface="Arial" panose="020B0604020202020204" pitchFamily="34" charset="0"/>
-              <a:buChar char="•"/>
-            </a:pPr>
-            <a:r>
-              <a:rPr lang="en-US" sz="1400" dirty="0"/>
-              <a:t>Iso = 1  -&gt;  Isotropic</a:t>
+            <a:r>
+              <a:rPr lang="en-US" sz="1000" dirty="0"/>
+              <a:t>(From Blum et al, 2015)</a:t>
+            </a:r>
+          </a:p>
+        </p:txBody>
+      </p:sp>
+      <p:sp>
+        <p:nvSpPr>
+          <p:cNvPr id="10" name="Title 1">
+            <a:extLst>
+              <a:ext uri="{FF2B5EF4-FFF2-40B4-BE49-F238E27FC236}">
+                <a16:creationId xmlns:a16="http://schemas.microsoft.com/office/drawing/2014/main" id="{ED29CA46-BEBD-4E9B-8777-EBD2B33D351B}"/>
+              </a:ext>
+            </a:extLst>
+          </p:cNvPr>
+          <p:cNvSpPr txBox="1">
+            <a:spLocks/>
+          </p:cNvSpPr>
+          <p:nvPr/>
+        </p:nvSpPr>
+        <p:spPr>
+          <a:xfrm>
+            <a:off x="527480" y="20275"/>
+            <a:ext cx="10515600" cy="1325563"/>
+          </a:xfrm>
+          <a:prstGeom prst="rect">
+            <a:avLst/>
+          </a:prstGeom>
+        </p:spPr>
+        <p:txBody>
+          <a:bodyPr vert="horz" lIns="91440" tIns="45720" rIns="91440" bIns="45720" rtlCol="0" anchor="ctr">
+            <a:normAutofit/>
+          </a:bodyPr>
+          <a:lstStyle>
+            <a:lvl1pPr algn="l" defTabSz="914400" rtl="0" eaLnBrk="1" latinLnBrk="0" hangingPunct="1">
+              <a:lnSpc>
+                <a:spcPct val="90000"/>
+              </a:lnSpc>
+              <a:spcBef>
+                <a:spcPct val="0"/>
+              </a:spcBef>
+              <a:buNone/>
+              <a:defRPr sz="4400" kern="1200">
+                <a:solidFill>
+                  <a:schemeClr val="tx1"/>
+                </a:solidFill>
+                <a:latin typeface="+mj-lt"/>
+                <a:ea typeface="+mj-ea"/>
+                <a:cs typeface="+mj-cs"/>
+              </a:defRPr>
+            </a:lvl1pPr>
+          </a:lstStyle>
+          <a:p>
+            <a:r>
+              <a:rPr lang="en-US" dirty="0"/>
+              <a:t>Introduction</a:t>
             </a:r>
           </a:p>
         </p:txBody>
@@ -3999,7 +4638,7 @@
     </p:spTree>
     <p:extLst>
       <p:ext uri="{BB962C8B-B14F-4D97-AF65-F5344CB8AC3E}">
-        <p14:creationId xmlns:p14="http://schemas.microsoft.com/office/powerpoint/2010/main" val="2291660107"/>
+        <p14:creationId xmlns:p14="http://schemas.microsoft.com/office/powerpoint/2010/main" val="1081517717"/>
       </p:ext>
     </p:extLst>
   </p:cSld>
@@ -4031,7 +4670,7 @@
           <p:cNvPr id="2" name="Title 1">
             <a:extLst>
               <a:ext uri="{FF2B5EF4-FFF2-40B4-BE49-F238E27FC236}">
-                <a16:creationId xmlns:a16="http://schemas.microsoft.com/office/drawing/2014/main" id="{115FFF59-A7F3-4D06-82DF-C621767722D0}"/>
+                <a16:creationId xmlns:a16="http://schemas.microsoft.com/office/drawing/2014/main" id="{B0B672F6-6363-456A-BAA8-77C02F2E0E06}"/>
               </a:ext>
             </a:extLst>
           </p:cNvPr>
@@ -4042,24 +4681,146 @@
             <p:ph type="title"/>
           </p:nvPr>
         </p:nvSpPr>
-        <p:spPr/>
+        <p:spPr>
+          <a:xfrm>
+            <a:off x="473892" y="44325"/>
+            <a:ext cx="10515600" cy="1325563"/>
+          </a:xfrm>
+        </p:spPr>
         <p:txBody>
           <a:bodyPr/>
           <a:lstStyle/>
           <a:p>
             <a:r>
               <a:rPr lang="en-US" dirty="0"/>
-              <a:t>Statistical Year Study</a:t>
+              <a:t>Mission Background</a:t>
+            </a:r>
+          </a:p>
+        </p:txBody>
+      </p:sp>
+      <p:sp>
+        <p:nvSpPr>
+          <p:cNvPr id="10" name="TextBox 9">
+            <a:extLst>
+              <a:ext uri="{FF2B5EF4-FFF2-40B4-BE49-F238E27FC236}">
+                <a16:creationId xmlns:a16="http://schemas.microsoft.com/office/drawing/2014/main" id="{6747903C-31A9-43DC-A85C-CEF2EC4F4DA2}"/>
+              </a:ext>
+            </a:extLst>
+          </p:cNvPr>
+          <p:cNvSpPr txBox="1"/>
+          <p:nvPr/>
+        </p:nvSpPr>
+        <p:spPr>
+          <a:xfrm>
+            <a:off x="742233" y="1519905"/>
+            <a:ext cx="4341495" cy="954107"/>
+          </a:xfrm>
+          <a:prstGeom prst="rect">
+            <a:avLst/>
+          </a:prstGeom>
+          <a:noFill/>
+        </p:spPr>
+        <p:txBody>
+          <a:bodyPr wrap="square">
+            <a:spAutoFit/>
+          </a:bodyPr>
+          <a:lstStyle/>
+          <a:p>
+            <a:pPr marL="285750" indent="-285750">
+              <a:buFont typeface="Arial" panose="020B0604020202020204" pitchFamily="34" charset="0"/>
+              <a:buChar char="•"/>
+            </a:pPr>
+            <a:r>
+              <a:rPr lang="en-US" sz="1400" dirty="0"/>
+              <a:t>The Solar Anomalous and Magnetospheric Particle Explorer (SAMPEX) satellite collected information about particles in the Earth’s radiation belts in near polar orbit from 1992-2004</a:t>
             </a:r>
           </a:p>
         </p:txBody>
       </p:sp>
       <p:pic>
         <p:nvPicPr>
-          <p:cNvPr id="4" name="Picture 2">
-            <a:extLst>
-              <a:ext uri="{FF2B5EF4-FFF2-40B4-BE49-F238E27FC236}">
-                <a16:creationId xmlns:a16="http://schemas.microsoft.com/office/drawing/2014/main" id="{F1303A6D-9CDE-40E4-A785-F896D7315D6E}"/>
+          <p:cNvPr id="12" name="Content Placeholder 4" descr="Diagram, engineering drawing&#10;&#10;Description automatically generated">
+            <a:extLst>
+              <a:ext uri="{FF2B5EF4-FFF2-40B4-BE49-F238E27FC236}">
+                <a16:creationId xmlns:a16="http://schemas.microsoft.com/office/drawing/2014/main" id="{DA7ED596-6304-462E-A735-A790DF006CE3}"/>
+              </a:ext>
+            </a:extLst>
+          </p:cNvPr>
+          <p:cNvPicPr>
+            <a:picLocks noGrp="1" noChangeAspect="1"/>
+          </p:cNvPicPr>
+          <p:nvPr>
+            <p:ph idx="1"/>
+          </p:nvPr>
+        </p:nvPicPr>
+        <p:blipFill>
+          <a:blip r:embed="rId2">
+            <a:extLst>
+              <a:ext uri="{28A0092B-C50C-407E-A947-70E740481C1C}">
+                <a14:useLocalDpi xmlns:a14="http://schemas.microsoft.com/office/drawing/2010/main" val="0"/>
+              </a:ext>
+            </a:extLst>
+          </a:blip>
+          <a:stretch>
+            <a:fillRect/>
+          </a:stretch>
+        </p:blipFill>
+        <p:spPr>
+          <a:xfrm>
+            <a:off x="1179579" y="3578138"/>
+            <a:ext cx="3717710" cy="2772233"/>
+          </a:xfrm>
+        </p:spPr>
+      </p:pic>
+      <p:sp>
+        <p:nvSpPr>
+          <p:cNvPr id="13" name="TextBox 12">
+            <a:extLst>
+              <a:ext uri="{FF2B5EF4-FFF2-40B4-BE49-F238E27FC236}">
+                <a16:creationId xmlns:a16="http://schemas.microsoft.com/office/drawing/2014/main" id="{2945EF3C-799D-4C11-95EA-CA824E30CAE3}"/>
+              </a:ext>
+            </a:extLst>
+          </p:cNvPr>
+          <p:cNvSpPr txBox="1"/>
+          <p:nvPr/>
+        </p:nvSpPr>
+        <p:spPr>
+          <a:xfrm>
+            <a:off x="3367414" y="6350371"/>
+            <a:ext cx="1529875" cy="246221"/>
+          </a:xfrm>
+          <a:prstGeom prst="rect">
+            <a:avLst/>
+          </a:prstGeom>
+          <a:noFill/>
+        </p:spPr>
+        <p:txBody>
+          <a:bodyPr wrap="square">
+            <a:spAutoFit/>
+          </a:bodyPr>
+          <a:lstStyle/>
+          <a:p>
+            <a:r>
+              <a:rPr lang="en-US" sz="1000" dirty="0"/>
+              <a:t>(From </a:t>
+            </a:r>
+            <a:r>
+              <a:rPr lang="en-US" sz="1000" dirty="0" err="1"/>
+              <a:t>eoPortal</a:t>
+            </a:r>
+            <a:r>
+              <a:rPr lang="en-US" sz="1000" dirty="0"/>
+              <a:t> Directory)</a:t>
+            </a:r>
+          </a:p>
+        </p:txBody>
+      </p:sp>
+      <p:pic>
+        <p:nvPicPr>
+          <p:cNvPr id="5122" name="Picture 2">
+            <a:extLst>
+              <a:ext uri="{FF2B5EF4-FFF2-40B4-BE49-F238E27FC236}">
+                <a16:creationId xmlns:a16="http://schemas.microsoft.com/office/drawing/2014/main" id="{1287E68C-E09E-4684-9124-596012421D0D}"/>
               </a:ext>
             </a:extLst>
           </p:cNvPr>
@@ -4068,29 +4829,28 @@
           </p:cNvPicPr>
           <p:nvPr/>
         </p:nvPicPr>
-        <p:blipFill rotWithShape="1">
-          <a:blip r:embed="rId2">
+        <p:blipFill>
+          <a:blip r:embed="rId3">
             <a:extLst>
               <a:ext uri="{28A0092B-C50C-407E-A947-70E740481C1C}">
                 <a14:useLocalDpi xmlns:a14="http://schemas.microsoft.com/office/drawing/2010/main" val="0"/>
               </a:ext>
             </a:extLst>
           </a:blip>
-          <a:srcRect r="48547" b="49475"/>
-          <a:stretch/>
+          <a:srcRect/>
+          <a:stretch>
+            <a:fillRect/>
+          </a:stretch>
         </p:blipFill>
         <p:spPr bwMode="auto">
           <a:xfrm>
-            <a:off x="1729647" y="1932494"/>
-            <a:ext cx="3978521" cy="4196262"/>
+            <a:off x="5509230" y="725648"/>
+            <a:ext cx="5848179" cy="2703352"/>
           </a:xfrm>
           <a:prstGeom prst="rect">
             <a:avLst/>
           </a:prstGeom>
           <a:noFill/>
-          <a:ln w="19050">
-            <a:noFill/>
-          </a:ln>
           <a:extLst>
             <a:ext uri="{909E8E84-426E-40DD-AFC4-6F175D3DCCD1}">
               <a14:hiddenFill xmlns:a14="http://schemas.microsoft.com/office/drawing/2010/main">
@@ -4102,10 +4862,48 @@
           </a:extLst>
         </p:spPr>
       </p:pic>
+      <p:sp>
+        <p:nvSpPr>
+          <p:cNvPr id="7" name="Rectangle 6">
+            <a:extLst>
+              <a:ext uri="{FF2B5EF4-FFF2-40B4-BE49-F238E27FC236}">
+                <a16:creationId xmlns:a16="http://schemas.microsoft.com/office/drawing/2014/main" id="{F91ECB05-754B-4116-90B5-77491706C280}"/>
+              </a:ext>
+            </a:extLst>
+          </p:cNvPr>
+          <p:cNvSpPr/>
+          <p:nvPr/>
+        </p:nvSpPr>
+        <p:spPr>
+          <a:xfrm>
+            <a:off x="5359060" y="4110323"/>
+            <a:ext cx="4335008" cy="954107"/>
+          </a:xfrm>
+          <a:prstGeom prst="rect">
+            <a:avLst/>
+          </a:prstGeom>
+        </p:spPr>
+        <p:txBody>
+          <a:bodyPr wrap="square">
+            <a:spAutoFit/>
+          </a:bodyPr>
+          <a:lstStyle/>
+          <a:p>
+            <a:pPr marL="285750" indent="-285750">
+              <a:buFont typeface="Arial" panose="020B0604020202020204" pitchFamily="34" charset="0"/>
+              <a:buChar char="•"/>
+            </a:pPr>
+            <a:r>
+              <a:rPr lang="en-US" sz="1400" dirty="0"/>
+              <a:t>The Heavy Ion Large Telescope (HILT) instrument onboard the SAMPEX satellite consisted of 4x4 Silicon detector array that recorded &gt;1 MeV electron counts in high latitude regions of the magnetosphere</a:t>
+            </a:r>
+          </a:p>
+        </p:txBody>
+      </p:sp>
     </p:spTree>
     <p:extLst>
       <p:ext uri="{BB962C8B-B14F-4D97-AF65-F5344CB8AC3E}">
-        <p14:creationId xmlns:p14="http://schemas.microsoft.com/office/powerpoint/2010/main" val="2153237620"/>
+        <p14:creationId xmlns:p14="http://schemas.microsoft.com/office/powerpoint/2010/main" val="2291660107"/>
       </p:ext>
     </p:extLst>
   </p:cSld>
@@ -4137,7 +4935,7 @@
           <p:cNvPr id="2" name="Title 1">
             <a:extLst>
               <a:ext uri="{FF2B5EF4-FFF2-40B4-BE49-F238E27FC236}">
-                <a16:creationId xmlns:a16="http://schemas.microsoft.com/office/drawing/2014/main" id="{BE5CAA0F-5BE5-4547-8B7C-52D115C53B03}"/>
+                <a16:creationId xmlns:a16="http://schemas.microsoft.com/office/drawing/2014/main" id="{4591C8F4-CD5A-49A0-B991-0E2C1863B1CE}"/>
               </a:ext>
             </a:extLst>
           </p:cNvPr>
@@ -4155,17 +4953,17 @@
           <a:p>
             <a:r>
               <a:rPr lang="en-US" dirty="0"/>
-              <a:t>Statistical Year Study</a:t>
+              <a:t>Mission Background</a:t>
             </a:r>
           </a:p>
         </p:txBody>
       </p:sp>
       <p:pic>
         <p:nvPicPr>
-          <p:cNvPr id="4" name="Picture 3">
-            <a:extLst>
-              <a:ext uri="{FF2B5EF4-FFF2-40B4-BE49-F238E27FC236}">
-                <a16:creationId xmlns:a16="http://schemas.microsoft.com/office/drawing/2014/main" id="{AB69D2CC-BE5E-44D1-9DA9-88F3AC3A9C5A}"/>
+          <p:cNvPr id="4" name="Picture 3" descr="Diagram&#10;&#10;Description automatically generated">
+            <a:extLst>
+              <a:ext uri="{FF2B5EF4-FFF2-40B4-BE49-F238E27FC236}">
+                <a16:creationId xmlns:a16="http://schemas.microsoft.com/office/drawing/2014/main" id="{1EB4C642-C715-40A1-B678-D96FF69E64DC}"/>
               </a:ext>
             </a:extLst>
           </p:cNvPr>
@@ -4174,7 +4972,7 @@
           </p:cNvPicPr>
           <p:nvPr/>
         </p:nvPicPr>
-        <p:blipFill rotWithShape="1">
+        <p:blipFill>
           <a:blip r:embed="rId2">
             <a:extLst>
               <a:ext uri="{28A0092B-C50C-407E-A947-70E740481C1C}">
@@ -4182,28 +4980,188 @@
               </a:ext>
             </a:extLst>
           </a:blip>
-          <a:srcRect l="50958" t="49867" b="-1"/>
-          <a:stretch/>
+          <a:stretch>
+            <a:fillRect/>
+          </a:stretch>
         </p:blipFill>
         <p:spPr>
           <a:xfrm>
-            <a:off x="1040832" y="4008418"/>
-            <a:ext cx="2566274" cy="2179294"/>
+            <a:off x="6367497" y="726374"/>
+            <a:ext cx="4141558" cy="3018846"/>
           </a:xfrm>
           <a:prstGeom prst="rect">
             <a:avLst/>
           </a:prstGeom>
-          <a:ln w="19050">
-            <a:noFill/>
+          <a:ln w="28575">
+            <a:solidFill>
+              <a:schemeClr val="tx1"/>
+            </a:solidFill>
           </a:ln>
         </p:spPr>
       </p:pic>
+      <p:sp>
+        <p:nvSpPr>
+          <p:cNvPr id="5" name="TextBox 4">
+            <a:extLst>
+              <a:ext uri="{FF2B5EF4-FFF2-40B4-BE49-F238E27FC236}">
+                <a16:creationId xmlns:a16="http://schemas.microsoft.com/office/drawing/2014/main" id="{F603F547-CEBF-4252-BE7D-3D91CC38EF82}"/>
+              </a:ext>
+            </a:extLst>
+          </p:cNvPr>
+          <p:cNvSpPr txBox="1"/>
+          <p:nvPr/>
+        </p:nvSpPr>
+        <p:spPr>
+          <a:xfrm>
+            <a:off x="9208926" y="3745220"/>
+            <a:ext cx="1529875" cy="246221"/>
+          </a:xfrm>
+          <a:prstGeom prst="rect">
+            <a:avLst/>
+          </a:prstGeom>
+          <a:noFill/>
+        </p:spPr>
+        <p:txBody>
+          <a:bodyPr wrap="square">
+            <a:spAutoFit/>
+          </a:bodyPr>
+          <a:lstStyle/>
+          <a:p>
+            <a:r>
+              <a:rPr lang="en-US" sz="1000" dirty="0"/>
+              <a:t>(From Blake et al, 1996)</a:t>
+            </a:r>
+          </a:p>
+        </p:txBody>
+      </p:sp>
+      <p:sp>
+        <p:nvSpPr>
+          <p:cNvPr id="6" name="TextBox 5">
+            <a:extLst>
+              <a:ext uri="{FF2B5EF4-FFF2-40B4-BE49-F238E27FC236}">
+                <a16:creationId xmlns:a16="http://schemas.microsoft.com/office/drawing/2014/main" id="{097824C4-03DF-4F91-BC25-EAB416A2F330}"/>
+              </a:ext>
+            </a:extLst>
+          </p:cNvPr>
+          <p:cNvSpPr txBox="1"/>
+          <p:nvPr/>
+        </p:nvSpPr>
+        <p:spPr>
+          <a:xfrm>
+            <a:off x="5828901" y="4197380"/>
+            <a:ext cx="4380501" cy="1169551"/>
+          </a:xfrm>
+          <a:prstGeom prst="rect">
+            <a:avLst/>
+          </a:prstGeom>
+          <a:noFill/>
+        </p:spPr>
+        <p:txBody>
+          <a:bodyPr wrap="square">
+            <a:spAutoFit/>
+          </a:bodyPr>
+          <a:lstStyle/>
+          <a:p>
+            <a:pPr marL="285750" indent="-285750">
+              <a:buFont typeface="Arial" panose="020B0604020202020204" pitchFamily="34" charset="0"/>
+              <a:buChar char="•"/>
+            </a:pPr>
+            <a:r>
+              <a:rPr lang="en-US" sz="1400" dirty="0"/>
+              <a:t>By taking the ratio of electron counts from Row 1 (SSD1) and Row 4 (SSD4) of the detectors,  a measure of </a:t>
+            </a:r>
+            <a:r>
+              <a:rPr lang="en-US" sz="1400" u="sng" dirty="0"/>
+              <a:t>pitch angle isotropy</a:t>
+            </a:r>
+            <a:r>
+              <a:rPr lang="en-US" sz="1400" dirty="0"/>
+              <a:t> can be determined, where:</a:t>
+            </a:r>
+          </a:p>
+          <a:p>
+            <a:pPr marL="742950" lvl="1" indent="-285750">
+              <a:buFont typeface="Arial" panose="020B0604020202020204" pitchFamily="34" charset="0"/>
+              <a:buChar char="•"/>
+            </a:pPr>
+            <a:r>
+              <a:rPr lang="en-US" sz="1400" dirty="0"/>
+              <a:t>Iso = 0  -&gt;  Anisotropic</a:t>
+            </a:r>
+          </a:p>
+          <a:p>
+            <a:pPr marL="742950" lvl="1" indent="-285750">
+              <a:buFont typeface="Arial" panose="020B0604020202020204" pitchFamily="34" charset="0"/>
+              <a:buChar char="•"/>
+            </a:pPr>
+            <a:r>
+              <a:rPr lang="en-US" sz="1400" dirty="0"/>
+              <a:t>Iso = 1  -&gt;  Isotropic</a:t>
+            </a:r>
+          </a:p>
+        </p:txBody>
+      </p:sp>
+      <p:sp>
+        <p:nvSpPr>
+          <p:cNvPr id="8" name="Rectangle 7">
+            <a:extLst>
+              <a:ext uri="{FF2B5EF4-FFF2-40B4-BE49-F238E27FC236}">
+                <a16:creationId xmlns:a16="http://schemas.microsoft.com/office/drawing/2014/main" id="{56F8EC77-5529-49DB-A432-3CC8CD83B83B}"/>
+              </a:ext>
+            </a:extLst>
+          </p:cNvPr>
+          <p:cNvSpPr/>
+          <p:nvPr/>
+        </p:nvSpPr>
+        <p:spPr>
+          <a:xfrm>
+            <a:off x="984308" y="1644956"/>
+            <a:ext cx="4538445" cy="1815882"/>
+          </a:xfrm>
+          <a:prstGeom prst="rect">
+            <a:avLst/>
+          </a:prstGeom>
+        </p:spPr>
+        <p:txBody>
+          <a:bodyPr wrap="square">
+            <a:spAutoFit/>
+          </a:bodyPr>
+          <a:lstStyle/>
+          <a:p>
+            <a:pPr marL="285750" indent="-285750">
+              <a:buFont typeface="Arial" panose="020B0604020202020204" pitchFamily="34" charset="0"/>
+              <a:buChar char="•"/>
+            </a:pPr>
+            <a:r>
+              <a:rPr lang="en-US" sz="1400" dirty="0"/>
+              <a:t>When anisotropic populations of electrons are collected by the HILT instrument, the geometry of the detector rows will cause differences in the total electron counts detected across the array.</a:t>
+            </a:r>
+          </a:p>
+          <a:p>
+            <a:pPr marL="285750" indent="-285750">
+              <a:buFont typeface="Arial" panose="020B0604020202020204" pitchFamily="34" charset="0"/>
+              <a:buChar char="•"/>
+            </a:pPr>
+            <a:r>
+              <a:rPr lang="en-US" sz="1400" dirty="0"/>
+              <a:t>Conversely when isotropic populations of electrons are collected by the HILT instrument, the total electron counts detected will be similar across the array.</a:t>
+            </a:r>
+          </a:p>
+          <a:p>
+            <a:pPr marL="285750" indent="-285750">
+              <a:buFont typeface="Arial" panose="020B0604020202020204" pitchFamily="34" charset="0"/>
+              <a:buChar char="•"/>
+            </a:pPr>
+            <a:endParaRPr lang="en-US" sz="1400" dirty="0"/>
+          </a:p>
+        </p:txBody>
+      </p:sp>
       <p:pic>
         <p:nvPicPr>
-          <p:cNvPr id="5" name="Picture 4">
-            <a:extLst>
-              <a:ext uri="{FF2B5EF4-FFF2-40B4-BE49-F238E27FC236}">
-                <a16:creationId xmlns:a16="http://schemas.microsoft.com/office/drawing/2014/main" id="{50F90E72-F5FA-45E5-AF6C-E0A2EB09FFA2}"/>
+          <p:cNvPr id="10" name="Picture 9">
+            <a:extLst>
+              <a:ext uri="{FF2B5EF4-FFF2-40B4-BE49-F238E27FC236}">
+                <a16:creationId xmlns:a16="http://schemas.microsoft.com/office/drawing/2014/main" id="{68177ABE-F0D1-4CAB-9CF4-F6BFEEF2A09F}"/>
               </a:ext>
             </a:extLst>
           </p:cNvPr>
@@ -4212,135 +5170,16 @@
           </p:cNvPicPr>
           <p:nvPr/>
         </p:nvPicPr>
-        <p:blipFill rotWithShape="1">
-          <a:blip r:embed="rId3">
-            <a:extLst>
-              <a:ext uri="{28A0092B-C50C-407E-A947-70E740481C1C}">
-                <a14:useLocalDpi xmlns:a14="http://schemas.microsoft.com/office/drawing/2010/main" val="0"/>
-              </a:ext>
-            </a:extLst>
-          </a:blip>
-          <a:srcRect l="49404" t="49828"/>
-          <a:stretch/>
+        <p:blipFill>
+          <a:blip r:embed="rId3"/>
+          <a:stretch>
+            <a:fillRect/>
+          </a:stretch>
         </p:blipFill>
         <p:spPr>
           <a:xfrm>
-            <a:off x="3718138" y="4042798"/>
-            <a:ext cx="2661428" cy="2170560"/>
-          </a:xfrm>
-          <a:prstGeom prst="rect">
-            <a:avLst/>
-          </a:prstGeom>
-          <a:ln w="19050">
-            <a:noFill/>
-          </a:ln>
-        </p:spPr>
-      </p:pic>
-      <p:pic>
-        <p:nvPicPr>
-          <p:cNvPr id="6" name="Picture 5">
-            <a:extLst>
-              <a:ext uri="{FF2B5EF4-FFF2-40B4-BE49-F238E27FC236}">
-                <a16:creationId xmlns:a16="http://schemas.microsoft.com/office/drawing/2014/main" id="{51DCC4EE-543D-497C-A756-DDF9D2AE1D21}"/>
-              </a:ext>
-            </a:extLst>
-          </p:cNvPr>
-          <p:cNvPicPr>
-            <a:picLocks noChangeAspect="1"/>
-          </p:cNvPicPr>
-          <p:nvPr/>
-        </p:nvPicPr>
-        <p:blipFill rotWithShape="1">
-          <a:blip r:embed="rId2">
-            <a:extLst>
-              <a:ext uri="{28A0092B-C50C-407E-A947-70E740481C1C}">
-                <a14:useLocalDpi xmlns:a14="http://schemas.microsoft.com/office/drawing/2010/main" val="0"/>
-              </a:ext>
-            </a:extLst>
-          </a:blip>
-          <a:srcRect l="49433" b="50155"/>
-          <a:stretch/>
-        </p:blipFill>
-        <p:spPr>
-          <a:xfrm>
-            <a:off x="945678" y="1781463"/>
-            <a:ext cx="2661428" cy="2179294"/>
-          </a:xfrm>
-          <a:prstGeom prst="rect">
-            <a:avLst/>
-          </a:prstGeom>
-          <a:ln w="19050">
-            <a:noFill/>
-          </a:ln>
-        </p:spPr>
-      </p:pic>
-      <p:pic>
-        <p:nvPicPr>
-          <p:cNvPr id="7" name="Picture 6">
-            <a:extLst>
-              <a:ext uri="{FF2B5EF4-FFF2-40B4-BE49-F238E27FC236}">
-                <a16:creationId xmlns:a16="http://schemas.microsoft.com/office/drawing/2014/main" id="{2B71AE17-B39E-451C-B5B0-867FF6CCAE31}"/>
-              </a:ext>
-            </a:extLst>
-          </p:cNvPr>
-          <p:cNvPicPr>
-            <a:picLocks noChangeAspect="1"/>
-          </p:cNvPicPr>
-          <p:nvPr/>
-        </p:nvPicPr>
-        <p:blipFill rotWithShape="1">
-          <a:blip r:embed="rId3">
-            <a:extLst>
-              <a:ext uri="{28A0092B-C50C-407E-A947-70E740481C1C}">
-                <a14:useLocalDpi xmlns:a14="http://schemas.microsoft.com/office/drawing/2010/main" val="0"/>
-              </a:ext>
-            </a:extLst>
-          </a:blip>
-          <a:srcRect l="48319" b="50138"/>
-          <a:stretch/>
-        </p:blipFill>
-        <p:spPr>
-          <a:xfrm>
-            <a:off x="3644117" y="1781463"/>
-            <a:ext cx="2735449" cy="2170560"/>
-          </a:xfrm>
-          <a:prstGeom prst="rect">
-            <a:avLst/>
-          </a:prstGeom>
-          <a:ln w="19050">
-            <a:noFill/>
-          </a:ln>
-        </p:spPr>
-      </p:pic>
-      <p:pic>
-        <p:nvPicPr>
-          <p:cNvPr id="8" name="Picture 7">
-            <a:extLst>
-              <a:ext uri="{FF2B5EF4-FFF2-40B4-BE49-F238E27FC236}">
-                <a16:creationId xmlns:a16="http://schemas.microsoft.com/office/drawing/2014/main" id="{8C9AAE1E-E82A-4922-8677-A9F938205BA8}"/>
-              </a:ext>
-            </a:extLst>
-          </p:cNvPr>
-          <p:cNvPicPr>
-            <a:picLocks noChangeAspect="1"/>
-          </p:cNvPicPr>
-          <p:nvPr/>
-        </p:nvPicPr>
-        <p:blipFill rotWithShape="1">
-          <a:blip r:embed="rId4">
-            <a:extLst>
-              <a:ext uri="{28A0092B-C50C-407E-A947-70E740481C1C}">
-                <a14:useLocalDpi xmlns:a14="http://schemas.microsoft.com/office/drawing/2010/main" val="0"/>
-              </a:ext>
-            </a:extLst>
-          </a:blip>
-          <a:srcRect l="50930" b="49885"/>
-          <a:stretch/>
-        </p:blipFill>
-        <p:spPr>
-          <a:xfrm>
-            <a:off x="7114316" y="2492160"/>
-            <a:ext cx="3471064" cy="2919726"/>
+            <a:off x="1479097" y="3398925"/>
+            <a:ext cx="3170311" cy="3253973"/>
           </a:xfrm>
           <a:prstGeom prst="rect">
             <a:avLst/>
@@ -4350,7 +5189,7 @@
     </p:spTree>
     <p:extLst>
       <p:ext uri="{BB962C8B-B14F-4D97-AF65-F5344CB8AC3E}">
-        <p14:creationId xmlns:p14="http://schemas.microsoft.com/office/powerpoint/2010/main" val="1220671070"/>
+        <p14:creationId xmlns:p14="http://schemas.microsoft.com/office/powerpoint/2010/main" val="2616325545"/>
       </p:ext>
     </p:extLst>
   </p:cSld>
@@ -4382,6 +5221,337 @@
           <p:cNvPr id="2" name="Title 1">
             <a:extLst>
               <a:ext uri="{FF2B5EF4-FFF2-40B4-BE49-F238E27FC236}">
+                <a16:creationId xmlns:a16="http://schemas.microsoft.com/office/drawing/2014/main" id="{115FFF59-A7F3-4D06-82DF-C621767722D0}"/>
+              </a:ext>
+            </a:extLst>
+          </p:cNvPr>
+          <p:cNvSpPr>
+            <a:spLocks noGrp="1"/>
+          </p:cNvSpPr>
+          <p:nvPr>
+            <p:ph type="title"/>
+          </p:nvPr>
+        </p:nvSpPr>
+        <p:spPr/>
+        <p:txBody>
+          <a:bodyPr/>
+          <a:lstStyle/>
+          <a:p>
+            <a:r>
+              <a:rPr lang="en-US" dirty="0"/>
+              <a:t>Statistical Year Study</a:t>
+            </a:r>
+          </a:p>
+        </p:txBody>
+      </p:sp>
+      <p:pic>
+        <p:nvPicPr>
+          <p:cNvPr id="4" name="Picture 2">
+            <a:extLst>
+              <a:ext uri="{FF2B5EF4-FFF2-40B4-BE49-F238E27FC236}">
+                <a16:creationId xmlns:a16="http://schemas.microsoft.com/office/drawing/2014/main" id="{F1303A6D-9CDE-40E4-A785-F896D7315D6E}"/>
+              </a:ext>
+            </a:extLst>
+          </p:cNvPr>
+          <p:cNvPicPr>
+            <a:picLocks noChangeAspect="1" noChangeArrowheads="1"/>
+          </p:cNvPicPr>
+          <p:nvPr/>
+        </p:nvPicPr>
+        <p:blipFill rotWithShape="1">
+          <a:blip r:embed="rId2">
+            <a:extLst>
+              <a:ext uri="{28A0092B-C50C-407E-A947-70E740481C1C}">
+                <a14:useLocalDpi xmlns:a14="http://schemas.microsoft.com/office/drawing/2010/main" val="0"/>
+              </a:ext>
+            </a:extLst>
+          </a:blip>
+          <a:srcRect r="48547" b="49475"/>
+          <a:stretch/>
+        </p:blipFill>
+        <p:spPr bwMode="auto">
+          <a:xfrm>
+            <a:off x="9100132" y="3936681"/>
+            <a:ext cx="2532405" cy="2671002"/>
+          </a:xfrm>
+          <a:prstGeom prst="rect">
+            <a:avLst/>
+          </a:prstGeom>
+          <a:noFill/>
+          <a:ln w="19050">
+            <a:noFill/>
+          </a:ln>
+          <a:extLst>
+            <a:ext uri="{909E8E84-426E-40DD-AFC4-6F175D3DCCD1}">
+              <a14:hiddenFill xmlns:a14="http://schemas.microsoft.com/office/drawing/2010/main">
+                <a:solidFill>
+                  <a:srgbClr val="FFFFFF"/>
+                </a:solidFill>
+              </a14:hiddenFill>
+            </a:ext>
+          </a:extLst>
+        </p:spPr>
+      </p:pic>
+      <p:sp>
+        <p:nvSpPr>
+          <p:cNvPr id="5" name="Rectangle 4">
+            <a:extLst>
+              <a:ext uri="{FF2B5EF4-FFF2-40B4-BE49-F238E27FC236}">
+                <a16:creationId xmlns:a16="http://schemas.microsoft.com/office/drawing/2014/main" id="{24E24AC9-90CA-4D17-8A49-03173E79EE7A}"/>
+              </a:ext>
+            </a:extLst>
+          </p:cNvPr>
+          <p:cNvSpPr/>
+          <p:nvPr/>
+        </p:nvSpPr>
+        <p:spPr>
+          <a:xfrm>
+            <a:off x="1040832" y="1585247"/>
+            <a:ext cx="3154002" cy="369332"/>
+          </a:xfrm>
+          <a:prstGeom prst="rect">
+            <a:avLst/>
+          </a:prstGeom>
+        </p:spPr>
+        <p:txBody>
+          <a:bodyPr wrap="square">
+            <a:spAutoFit/>
+          </a:bodyPr>
+          <a:lstStyle/>
+          <a:p>
+            <a:pPr marL="285750" indent="-285750">
+              <a:buFont typeface="Arial" panose="020B0604020202020204" pitchFamily="34" charset="0"/>
+              <a:buChar char="•"/>
+            </a:pPr>
+            <a:r>
+              <a:rPr lang="en-US" u="sng" dirty="0"/>
+              <a:t>Results:</a:t>
+            </a:r>
+          </a:p>
+        </p:txBody>
+      </p:sp>
+      <p:pic>
+        <p:nvPicPr>
+          <p:cNvPr id="6" name="Picture 5">
+            <a:extLst>
+              <a:ext uri="{FF2B5EF4-FFF2-40B4-BE49-F238E27FC236}">
+                <a16:creationId xmlns:a16="http://schemas.microsoft.com/office/drawing/2014/main" id="{5B280B36-D407-4E39-A3DE-10A0C4376ACA}"/>
+              </a:ext>
+            </a:extLst>
+          </p:cNvPr>
+          <p:cNvPicPr>
+            <a:picLocks noChangeAspect="1"/>
+          </p:cNvPicPr>
+          <p:nvPr/>
+        </p:nvPicPr>
+        <p:blipFill rotWithShape="1">
+          <a:blip r:embed="rId3">
+            <a:extLst>
+              <a:ext uri="{28A0092B-C50C-407E-A947-70E740481C1C}">
+                <a14:useLocalDpi xmlns:a14="http://schemas.microsoft.com/office/drawing/2010/main" val="0"/>
+              </a:ext>
+            </a:extLst>
+          </a:blip>
+          <a:srcRect l="50958" t="49867" b="-1"/>
+          <a:stretch/>
+        </p:blipFill>
+        <p:spPr>
+          <a:xfrm>
+            <a:off x="871263" y="4961422"/>
+            <a:ext cx="1783437" cy="1514505"/>
+          </a:xfrm>
+          <a:prstGeom prst="rect">
+            <a:avLst/>
+          </a:prstGeom>
+          <a:ln w="19050">
+            <a:noFill/>
+          </a:ln>
+        </p:spPr>
+      </p:pic>
+      <p:pic>
+        <p:nvPicPr>
+          <p:cNvPr id="7" name="Picture 6">
+            <a:extLst>
+              <a:ext uri="{FF2B5EF4-FFF2-40B4-BE49-F238E27FC236}">
+                <a16:creationId xmlns:a16="http://schemas.microsoft.com/office/drawing/2014/main" id="{90FE3232-CEEF-4C3E-849A-711AD143A41E}"/>
+              </a:ext>
+            </a:extLst>
+          </p:cNvPr>
+          <p:cNvPicPr>
+            <a:picLocks noChangeAspect="1"/>
+          </p:cNvPicPr>
+          <p:nvPr/>
+        </p:nvPicPr>
+        <p:blipFill rotWithShape="1">
+          <a:blip r:embed="rId4">
+            <a:extLst>
+              <a:ext uri="{28A0092B-C50C-407E-A947-70E740481C1C}">
+                <a14:useLocalDpi xmlns:a14="http://schemas.microsoft.com/office/drawing/2010/main" val="0"/>
+              </a:ext>
+            </a:extLst>
+          </a:blip>
+          <a:srcRect l="49404" t="49828"/>
+          <a:stretch/>
+        </p:blipFill>
+        <p:spPr>
+          <a:xfrm>
+            <a:off x="2744507" y="4967492"/>
+            <a:ext cx="1849565" cy="1508435"/>
+          </a:xfrm>
+          <a:prstGeom prst="rect">
+            <a:avLst/>
+          </a:prstGeom>
+          <a:ln w="19050">
+            <a:noFill/>
+          </a:ln>
+        </p:spPr>
+      </p:pic>
+      <p:pic>
+        <p:nvPicPr>
+          <p:cNvPr id="8" name="Picture 7">
+            <a:extLst>
+              <a:ext uri="{FF2B5EF4-FFF2-40B4-BE49-F238E27FC236}">
+                <a16:creationId xmlns:a16="http://schemas.microsoft.com/office/drawing/2014/main" id="{7F9F89D3-40B5-4F10-9C47-86290CA41551}"/>
+              </a:ext>
+            </a:extLst>
+          </p:cNvPr>
+          <p:cNvPicPr>
+            <a:picLocks noChangeAspect="1"/>
+          </p:cNvPicPr>
+          <p:nvPr/>
+        </p:nvPicPr>
+        <p:blipFill rotWithShape="1">
+          <a:blip r:embed="rId3">
+            <a:extLst>
+              <a:ext uri="{28A0092B-C50C-407E-A947-70E740481C1C}">
+                <a14:useLocalDpi xmlns:a14="http://schemas.microsoft.com/office/drawing/2010/main" val="0"/>
+              </a:ext>
+            </a:extLst>
+          </a:blip>
+          <a:srcRect l="49433" b="50155"/>
+          <a:stretch/>
+        </p:blipFill>
+        <p:spPr>
+          <a:xfrm>
+            <a:off x="838200" y="3306995"/>
+            <a:ext cx="1849565" cy="1514505"/>
+          </a:xfrm>
+          <a:prstGeom prst="rect">
+            <a:avLst/>
+          </a:prstGeom>
+          <a:ln w="19050">
+            <a:noFill/>
+          </a:ln>
+        </p:spPr>
+      </p:pic>
+      <p:pic>
+        <p:nvPicPr>
+          <p:cNvPr id="9" name="Picture 8">
+            <a:extLst>
+              <a:ext uri="{FF2B5EF4-FFF2-40B4-BE49-F238E27FC236}">
+                <a16:creationId xmlns:a16="http://schemas.microsoft.com/office/drawing/2014/main" id="{8E3FA784-0A17-4B23-9167-47026C8C75D8}"/>
+              </a:ext>
+            </a:extLst>
+          </p:cNvPr>
+          <p:cNvPicPr>
+            <a:picLocks noChangeAspect="1"/>
+          </p:cNvPicPr>
+          <p:nvPr/>
+        </p:nvPicPr>
+        <p:blipFill rotWithShape="1">
+          <a:blip r:embed="rId4">
+            <a:extLst>
+              <a:ext uri="{28A0092B-C50C-407E-A947-70E740481C1C}">
+                <a14:useLocalDpi xmlns:a14="http://schemas.microsoft.com/office/drawing/2010/main" val="0"/>
+              </a:ext>
+            </a:extLst>
+          </a:blip>
+          <a:srcRect l="48319" b="50138"/>
+          <a:stretch/>
+        </p:blipFill>
+        <p:spPr>
+          <a:xfrm>
+            <a:off x="2744507" y="3313065"/>
+            <a:ext cx="1901006" cy="1508435"/>
+          </a:xfrm>
+          <a:prstGeom prst="rect">
+            <a:avLst/>
+          </a:prstGeom>
+          <a:ln w="19050">
+            <a:noFill/>
+          </a:ln>
+        </p:spPr>
+      </p:pic>
+      <p:pic>
+        <p:nvPicPr>
+          <p:cNvPr id="10" name="Picture 9">
+            <a:extLst>
+              <a:ext uri="{FF2B5EF4-FFF2-40B4-BE49-F238E27FC236}">
+                <a16:creationId xmlns:a16="http://schemas.microsoft.com/office/drawing/2014/main" id="{9B8D3764-BBB8-46B2-834B-6285A060CC91}"/>
+              </a:ext>
+            </a:extLst>
+          </p:cNvPr>
+          <p:cNvPicPr>
+            <a:picLocks noChangeAspect="1"/>
+          </p:cNvPicPr>
+          <p:nvPr/>
+        </p:nvPicPr>
+        <p:blipFill rotWithShape="1">
+          <a:blip r:embed="rId5">
+            <a:extLst>
+              <a:ext uri="{28A0092B-C50C-407E-A947-70E740481C1C}">
+                <a14:useLocalDpi xmlns:a14="http://schemas.microsoft.com/office/drawing/2010/main" val="0"/>
+              </a:ext>
+            </a:extLst>
+          </a:blip>
+          <a:srcRect l="50930" b="49885"/>
+          <a:stretch/>
+        </p:blipFill>
+        <p:spPr>
+          <a:xfrm>
+            <a:off x="5969931" y="3936681"/>
+            <a:ext cx="2903347" cy="2442184"/>
+          </a:xfrm>
+          <a:prstGeom prst="rect">
+            <a:avLst/>
+          </a:prstGeom>
+        </p:spPr>
+      </p:pic>
+    </p:spTree>
+    <p:extLst>
+      <p:ext uri="{BB962C8B-B14F-4D97-AF65-F5344CB8AC3E}">
+        <p14:creationId xmlns:p14="http://schemas.microsoft.com/office/powerpoint/2010/main" val="2153237620"/>
+      </p:ext>
+    </p:extLst>
+  </p:cSld>
+  <p:clrMapOvr>
+    <a:masterClrMapping/>
+  </p:clrMapOvr>
+</p:sld>
+</file>
+
+<file path=ppt/slides/slide8.xml><?xml version="1.0" encoding="utf-8"?>
+<p:sld xmlns:a="http://schemas.openxmlformats.org/drawingml/2006/main" xmlns:r="http://schemas.openxmlformats.org/officeDocument/2006/relationships" xmlns:p="http://schemas.openxmlformats.org/presentationml/2006/main">
+  <p:cSld>
+    <p:spTree>
+      <p:nvGrpSpPr>
+        <p:cNvPr id="1" name=""/>
+        <p:cNvGrpSpPr/>
+        <p:nvPr/>
+      </p:nvGrpSpPr>
+      <p:grpSpPr>
+        <a:xfrm>
+          <a:off x="0" y="0"/>
+          <a:ext cx="0" cy="0"/>
+          <a:chOff x="0" y="0"/>
+          <a:chExt cx="0" cy="0"/>
+        </a:xfrm>
+      </p:grpSpPr>
+      <p:sp>
+        <p:nvSpPr>
+          <p:cNvPr id="2" name="Title 1">
+            <a:extLst>
+              <a:ext uri="{FF2B5EF4-FFF2-40B4-BE49-F238E27FC236}">
                 <a16:creationId xmlns:a16="http://schemas.microsoft.com/office/drawing/2014/main" id="{50E044B2-7680-4BE0-A3D6-062F52CEC0EA}"/>
               </a:ext>
             </a:extLst>
@@ -4405,28 +5575,182 @@
           </a:p>
         </p:txBody>
       </p:sp>
-      <p:sp>
-        <p:nvSpPr>
-          <p:cNvPr id="3" name="Content Placeholder 2">
-            <a:extLst>
-              <a:ext uri="{FF2B5EF4-FFF2-40B4-BE49-F238E27FC236}">
-                <a16:creationId xmlns:a16="http://schemas.microsoft.com/office/drawing/2014/main" id="{E80FC902-14C7-4BFC-A594-98C4013E1183}"/>
-              </a:ext>
-            </a:extLst>
-          </p:cNvPr>
-          <p:cNvSpPr>
-            <a:spLocks noGrp="1"/>
-          </p:cNvSpPr>
-          <p:nvPr>
-            <p:ph idx="1"/>
-          </p:nvPr>
-        </p:nvSpPr>
-        <p:spPr/>
-        <p:txBody>
-          <a:bodyPr/>
-          <a:lstStyle/>
-          <a:p>
-            <a:endParaRPr lang="en-US" dirty="0"/>
+      <p:pic>
+        <p:nvPicPr>
+          <p:cNvPr id="1026" name="Picture 2">
+            <a:extLst>
+              <a:ext uri="{FF2B5EF4-FFF2-40B4-BE49-F238E27FC236}">
+                <a16:creationId xmlns:a16="http://schemas.microsoft.com/office/drawing/2014/main" id="{E33DEEA3-9BF2-4239-97FF-AD5677CA014B}"/>
+              </a:ext>
+            </a:extLst>
+          </p:cNvPr>
+          <p:cNvPicPr>
+            <a:picLocks noChangeAspect="1" noChangeArrowheads="1"/>
+          </p:cNvPicPr>
+          <p:nvPr/>
+        </p:nvPicPr>
+        <p:blipFill>
+          <a:blip r:embed="rId2">
+            <a:extLst>
+              <a:ext uri="{28A0092B-C50C-407E-A947-70E740481C1C}">
+                <a14:useLocalDpi xmlns:a14="http://schemas.microsoft.com/office/drawing/2010/main" val="0"/>
+              </a:ext>
+            </a:extLst>
+          </a:blip>
+          <a:srcRect/>
+          <a:stretch>
+            <a:fillRect/>
+          </a:stretch>
+        </p:blipFill>
+        <p:spPr bwMode="auto">
+          <a:xfrm>
+            <a:off x="8025681" y="3785591"/>
+            <a:ext cx="3736052" cy="2707284"/>
+          </a:xfrm>
+          <a:prstGeom prst="rect">
+            <a:avLst/>
+          </a:prstGeom>
+          <a:noFill/>
+          <a:extLst>
+            <a:ext uri="{909E8E84-426E-40DD-AFC4-6F175D3DCCD1}">
+              <a14:hiddenFill xmlns:a14="http://schemas.microsoft.com/office/drawing/2010/main">
+                <a:solidFill>
+                  <a:srgbClr val="FFFFFF"/>
+                </a:solidFill>
+              </a14:hiddenFill>
+            </a:ext>
+          </a:extLst>
+        </p:spPr>
+      </p:pic>
+      <p:pic>
+        <p:nvPicPr>
+          <p:cNvPr id="1028" name="Picture 4">
+            <a:extLst>
+              <a:ext uri="{FF2B5EF4-FFF2-40B4-BE49-F238E27FC236}">
+                <a16:creationId xmlns:a16="http://schemas.microsoft.com/office/drawing/2014/main" id="{509A598E-B7C3-49F5-BB0E-66505D7DD4A1}"/>
+              </a:ext>
+            </a:extLst>
+          </p:cNvPr>
+          <p:cNvPicPr>
+            <a:picLocks noChangeAspect="1" noChangeArrowheads="1"/>
+          </p:cNvPicPr>
+          <p:nvPr/>
+        </p:nvPicPr>
+        <p:blipFill>
+          <a:blip r:embed="rId3">
+            <a:extLst>
+              <a:ext uri="{28A0092B-C50C-407E-A947-70E740481C1C}">
+                <a14:useLocalDpi xmlns:a14="http://schemas.microsoft.com/office/drawing/2010/main" val="0"/>
+              </a:ext>
+            </a:extLst>
+          </a:blip>
+          <a:srcRect/>
+          <a:stretch>
+            <a:fillRect/>
+          </a:stretch>
+        </p:blipFill>
+        <p:spPr bwMode="auto">
+          <a:xfrm>
+            <a:off x="4179092" y="3785589"/>
+            <a:ext cx="3736052" cy="2632911"/>
+          </a:xfrm>
+          <a:prstGeom prst="rect">
+            <a:avLst/>
+          </a:prstGeom>
+          <a:noFill/>
+          <a:extLst>
+            <a:ext uri="{909E8E84-426E-40DD-AFC4-6F175D3DCCD1}">
+              <a14:hiddenFill xmlns:a14="http://schemas.microsoft.com/office/drawing/2010/main">
+                <a:solidFill>
+                  <a:srgbClr val="FFFFFF"/>
+                </a:solidFill>
+              </a14:hiddenFill>
+            </a:ext>
+          </a:extLst>
+        </p:spPr>
+      </p:pic>
+      <p:pic>
+        <p:nvPicPr>
+          <p:cNvPr id="1030" name="Picture 6">
+            <a:extLst>
+              <a:ext uri="{FF2B5EF4-FFF2-40B4-BE49-F238E27FC236}">
+                <a16:creationId xmlns:a16="http://schemas.microsoft.com/office/drawing/2014/main" id="{A4B4B166-0B26-40A0-9429-F317CBC212B1}"/>
+              </a:ext>
+            </a:extLst>
+          </p:cNvPr>
+          <p:cNvPicPr>
+            <a:picLocks noChangeAspect="1" noChangeArrowheads="1"/>
+          </p:cNvPicPr>
+          <p:nvPr/>
+        </p:nvPicPr>
+        <p:blipFill>
+          <a:blip r:embed="rId4">
+            <a:extLst>
+              <a:ext uri="{28A0092B-C50C-407E-A947-70E740481C1C}">
+                <a14:useLocalDpi xmlns:a14="http://schemas.microsoft.com/office/drawing/2010/main" val="0"/>
+              </a:ext>
+            </a:extLst>
+          </a:blip>
+          <a:srcRect/>
+          <a:stretch>
+            <a:fillRect/>
+          </a:stretch>
+        </p:blipFill>
+        <p:spPr bwMode="auto">
+          <a:xfrm>
+            <a:off x="332503" y="3785590"/>
+            <a:ext cx="3736052" cy="2632911"/>
+          </a:xfrm>
+          <a:prstGeom prst="rect">
+            <a:avLst/>
+          </a:prstGeom>
+          <a:noFill/>
+          <a:extLst>
+            <a:ext uri="{909E8E84-426E-40DD-AFC4-6F175D3DCCD1}">
+              <a14:hiddenFill xmlns:a14="http://schemas.microsoft.com/office/drawing/2010/main">
+                <a:solidFill>
+                  <a:srgbClr val="FFFFFF"/>
+                </a:solidFill>
+              </a14:hiddenFill>
+            </a:ext>
+          </a:extLst>
+        </p:spPr>
+      </p:pic>
+      <p:sp>
+        <p:nvSpPr>
+          <p:cNvPr id="8" name="Rectangle 7">
+            <a:extLst>
+              <a:ext uri="{FF2B5EF4-FFF2-40B4-BE49-F238E27FC236}">
+                <a16:creationId xmlns:a16="http://schemas.microsoft.com/office/drawing/2014/main" id="{F5073A56-7D1D-4D3D-9084-166A1E8873C7}"/>
+              </a:ext>
+            </a:extLst>
+          </p:cNvPr>
+          <p:cNvSpPr/>
+          <p:nvPr/>
+        </p:nvSpPr>
+        <p:spPr>
+          <a:xfrm>
+            <a:off x="1040832" y="1585247"/>
+            <a:ext cx="3154002" cy="369332"/>
+          </a:xfrm>
+          <a:prstGeom prst="rect">
+            <a:avLst/>
+          </a:prstGeom>
+        </p:spPr>
+        <p:txBody>
+          <a:bodyPr wrap="square">
+            <a:spAutoFit/>
+          </a:bodyPr>
+          <a:lstStyle/>
+          <a:p>
+            <a:pPr marL="285750" indent="-285750">
+              <a:buFont typeface="Arial" panose="020B0604020202020204" pitchFamily="34" charset="0"/>
+              <a:buChar char="•"/>
+            </a:pPr>
+            <a:r>
+              <a:rPr lang="en-US" u="sng" dirty="0"/>
+              <a:t>Results:</a:t>
+            </a:r>
           </a:p>
         </p:txBody>
       </p:sp>
@@ -4434,6 +5758,243 @@
     <p:extLst>
       <p:ext uri="{BB962C8B-B14F-4D97-AF65-F5344CB8AC3E}">
         <p14:creationId xmlns:p14="http://schemas.microsoft.com/office/powerpoint/2010/main" val="2967167501"/>
+      </p:ext>
+    </p:extLst>
+  </p:cSld>
+  <p:clrMapOvr>
+    <a:masterClrMapping/>
+  </p:clrMapOvr>
+</p:sld>
+</file>
+
+<file path=ppt/slides/slide9.xml><?xml version="1.0" encoding="utf-8"?>
+<p:sld xmlns:a="http://schemas.openxmlformats.org/drawingml/2006/main" xmlns:r="http://schemas.openxmlformats.org/officeDocument/2006/relationships" xmlns:p="http://schemas.openxmlformats.org/presentationml/2006/main">
+  <p:cSld>
+    <p:spTree>
+      <p:nvGrpSpPr>
+        <p:cNvPr id="1" name=""/>
+        <p:cNvGrpSpPr/>
+        <p:nvPr/>
+      </p:nvGrpSpPr>
+      <p:grpSpPr>
+        <a:xfrm>
+          <a:off x="0" y="0"/>
+          <a:ext cx="0" cy="0"/>
+          <a:chOff x="0" y="0"/>
+          <a:chExt cx="0" cy="0"/>
+        </a:xfrm>
+      </p:grpSpPr>
+      <p:pic>
+        <p:nvPicPr>
+          <p:cNvPr id="6" name="Picture 2">
+            <a:extLst>
+              <a:ext uri="{FF2B5EF4-FFF2-40B4-BE49-F238E27FC236}">
+                <a16:creationId xmlns:a16="http://schemas.microsoft.com/office/drawing/2014/main" id="{13BA5BE6-CF6F-47F2-813F-783B610919D9}"/>
+              </a:ext>
+            </a:extLst>
+          </p:cNvPr>
+          <p:cNvPicPr>
+            <a:picLocks noChangeAspect="1" noChangeArrowheads="1"/>
+          </p:cNvPicPr>
+          <p:nvPr/>
+        </p:nvPicPr>
+        <p:blipFill>
+          <a:blip r:embed="rId2">
+            <a:extLst>
+              <a:ext uri="{28A0092B-C50C-407E-A947-70E740481C1C}">
+                <a14:useLocalDpi xmlns:a14="http://schemas.microsoft.com/office/drawing/2010/main" val="0"/>
+              </a:ext>
+            </a:extLst>
+          </a:blip>
+          <a:srcRect/>
+          <a:stretch>
+            <a:fillRect/>
+          </a:stretch>
+        </p:blipFill>
+        <p:spPr bwMode="auto">
+          <a:xfrm>
+            <a:off x="332503" y="3785589"/>
+            <a:ext cx="3736052" cy="2742616"/>
+          </a:xfrm>
+          <a:prstGeom prst="rect">
+            <a:avLst/>
+          </a:prstGeom>
+          <a:noFill/>
+          <a:extLst>
+            <a:ext uri="{909E8E84-426E-40DD-AFC4-6F175D3DCCD1}">
+              <a14:hiddenFill xmlns:a14="http://schemas.microsoft.com/office/drawing/2010/main">
+                <a:solidFill>
+                  <a:srgbClr val="FFFFFF"/>
+                </a:solidFill>
+              </a14:hiddenFill>
+            </a:ext>
+          </a:extLst>
+        </p:spPr>
+      </p:pic>
+      <p:pic>
+        <p:nvPicPr>
+          <p:cNvPr id="7" name="Picture 4">
+            <a:extLst>
+              <a:ext uri="{FF2B5EF4-FFF2-40B4-BE49-F238E27FC236}">
+                <a16:creationId xmlns:a16="http://schemas.microsoft.com/office/drawing/2014/main" id="{1DF6C5F3-2FBB-498F-9126-B4CFFF4B6EB1}"/>
+              </a:ext>
+            </a:extLst>
+          </p:cNvPr>
+          <p:cNvPicPr>
+            <a:picLocks noChangeAspect="1" noChangeArrowheads="1"/>
+          </p:cNvPicPr>
+          <p:nvPr/>
+        </p:nvPicPr>
+        <p:blipFill>
+          <a:blip r:embed="rId3">
+            <a:extLst>
+              <a:ext uri="{28A0092B-C50C-407E-A947-70E740481C1C}">
+                <a14:useLocalDpi xmlns:a14="http://schemas.microsoft.com/office/drawing/2010/main" val="0"/>
+              </a:ext>
+            </a:extLst>
+          </a:blip>
+          <a:srcRect/>
+          <a:stretch>
+            <a:fillRect/>
+          </a:stretch>
+        </p:blipFill>
+        <p:spPr bwMode="auto">
+          <a:xfrm>
+            <a:off x="4179092" y="3785589"/>
+            <a:ext cx="3736052" cy="2742616"/>
+          </a:xfrm>
+          <a:prstGeom prst="rect">
+            <a:avLst/>
+          </a:prstGeom>
+          <a:noFill/>
+          <a:extLst>
+            <a:ext uri="{909E8E84-426E-40DD-AFC4-6F175D3DCCD1}">
+              <a14:hiddenFill xmlns:a14="http://schemas.microsoft.com/office/drawing/2010/main">
+                <a:solidFill>
+                  <a:srgbClr val="FFFFFF"/>
+                </a:solidFill>
+              </a14:hiddenFill>
+            </a:ext>
+          </a:extLst>
+        </p:spPr>
+      </p:pic>
+      <p:pic>
+        <p:nvPicPr>
+          <p:cNvPr id="8" name="Picture 6">
+            <a:extLst>
+              <a:ext uri="{FF2B5EF4-FFF2-40B4-BE49-F238E27FC236}">
+                <a16:creationId xmlns:a16="http://schemas.microsoft.com/office/drawing/2014/main" id="{062FCF86-6170-48FB-9A96-DF47DD4D481A}"/>
+              </a:ext>
+            </a:extLst>
+          </p:cNvPr>
+          <p:cNvPicPr>
+            <a:picLocks noChangeAspect="1" noChangeArrowheads="1"/>
+          </p:cNvPicPr>
+          <p:nvPr/>
+        </p:nvPicPr>
+        <p:blipFill>
+          <a:blip r:embed="rId4">
+            <a:extLst>
+              <a:ext uri="{28A0092B-C50C-407E-A947-70E740481C1C}">
+                <a14:useLocalDpi xmlns:a14="http://schemas.microsoft.com/office/drawing/2010/main" val="0"/>
+              </a:ext>
+            </a:extLst>
+          </a:blip>
+          <a:srcRect/>
+          <a:stretch>
+            <a:fillRect/>
+          </a:stretch>
+        </p:blipFill>
+        <p:spPr bwMode="auto">
+          <a:xfrm>
+            <a:off x="8025681" y="3785589"/>
+            <a:ext cx="3736052" cy="2707284"/>
+          </a:xfrm>
+          <a:prstGeom prst="rect">
+            <a:avLst/>
+          </a:prstGeom>
+          <a:noFill/>
+          <a:extLst>
+            <a:ext uri="{909E8E84-426E-40DD-AFC4-6F175D3DCCD1}">
+              <a14:hiddenFill xmlns:a14="http://schemas.microsoft.com/office/drawing/2010/main">
+                <a:solidFill>
+                  <a:srgbClr val="FFFFFF"/>
+                </a:solidFill>
+              </a14:hiddenFill>
+            </a:ext>
+          </a:extLst>
+        </p:spPr>
+      </p:pic>
+      <p:sp>
+        <p:nvSpPr>
+          <p:cNvPr id="2" name="Title 1">
+            <a:extLst>
+              <a:ext uri="{FF2B5EF4-FFF2-40B4-BE49-F238E27FC236}">
+                <a16:creationId xmlns:a16="http://schemas.microsoft.com/office/drawing/2014/main" id="{50E044B2-7680-4BE0-A3D6-062F52CEC0EA}"/>
+              </a:ext>
+            </a:extLst>
+          </p:cNvPr>
+          <p:cNvSpPr>
+            <a:spLocks noGrp="1"/>
+          </p:cNvSpPr>
+          <p:nvPr>
+            <p:ph type="title"/>
+          </p:nvPr>
+        </p:nvSpPr>
+        <p:spPr/>
+        <p:txBody>
+          <a:bodyPr/>
+          <a:lstStyle/>
+          <a:p>
+            <a:r>
+              <a:rPr lang="en-US" dirty="0"/>
+              <a:t>Storm-time Epoch Analysis</a:t>
+            </a:r>
+          </a:p>
+        </p:txBody>
+      </p:sp>
+      <p:sp>
+        <p:nvSpPr>
+          <p:cNvPr id="9" name="Rectangle 8">
+            <a:extLst>
+              <a:ext uri="{FF2B5EF4-FFF2-40B4-BE49-F238E27FC236}">
+                <a16:creationId xmlns:a16="http://schemas.microsoft.com/office/drawing/2014/main" id="{D33402E0-5C81-4F34-A79E-BCF710F4008E}"/>
+              </a:ext>
+            </a:extLst>
+          </p:cNvPr>
+          <p:cNvSpPr/>
+          <p:nvPr/>
+        </p:nvSpPr>
+        <p:spPr>
+          <a:xfrm>
+            <a:off x="1040832" y="1585247"/>
+            <a:ext cx="3154002" cy="369332"/>
+          </a:xfrm>
+          <a:prstGeom prst="rect">
+            <a:avLst/>
+          </a:prstGeom>
+        </p:spPr>
+        <p:txBody>
+          <a:bodyPr wrap="square">
+            <a:spAutoFit/>
+          </a:bodyPr>
+          <a:lstStyle/>
+          <a:p>
+            <a:pPr marL="285750" indent="-285750">
+              <a:buFont typeface="Arial" panose="020B0604020202020204" pitchFamily="34" charset="0"/>
+              <a:buChar char="•"/>
+            </a:pPr>
+            <a:r>
+              <a:rPr lang="en-US" u="sng" dirty="0"/>
+              <a:t>Results:</a:t>
+            </a:r>
+          </a:p>
+        </p:txBody>
+      </p:sp>
+    </p:spTree>
+    <p:extLst>
+      <p:ext uri="{BB962C8B-B14F-4D97-AF65-F5344CB8AC3E}">
+        <p14:creationId xmlns:p14="http://schemas.microsoft.com/office/powerpoint/2010/main" val="2142121066"/>
       </p:ext>
     </p:extLst>
   </p:cSld>

</xml_diff>